<commit_message>
Updated some figures and dates
</commit_message>
<xml_diff>
--- a/Getting Started with Spark.pptx
+++ b/Getting Started with Spark.pptx
@@ -244,6 +244,11 @@
       </a:defRPr>
     </a:lvl9pPr>
   </p:defaultTextStyle>
+  <p:extLst>
+    <p:ext uri="{EFAFB233-063F-42B5-8137-9DF3F51BA10A}">
+      <p15:sldGuideLst xmlns:p15="http://schemas.microsoft.com/office/powerpoint/2012/main"/>
+    </p:ext>
+  </p:extLst>
 </p:presentation>
 </file>
 
@@ -8482,45 +8487,37 @@
           </a:bodyPr>
           <a:lstStyle/>
           <a:p>
-            <a:pPr lvl="0" rtl="0">
-              <a:spcBef>
-                <a:spcPts val="0"/>
-              </a:spcBef>
-              <a:buNone/>
-            </a:pPr>
+            <a:pPr lvl="0"/>
             <a:r>
-              <a:rPr lang="en-US" b="1"/>
-              <a:t>https://www.google.com/trends/explore#q=%2Fm%2F0fdjtq%2C%20%2Fm%2F0ndhxqz&amp;cmpt=q&amp;tz=Etc%2FGMT%2B4</a:t>
+              <a:rPr lang="en-US" b="1" dirty="0"/>
+              <a:t>https://trends.google.com/trends/explore?q=Apache%20Hadoop,Apache%20Spark</a:t>
             </a:r>
+            <a:endParaRPr lang="en-US" b="1" dirty="0"/>
           </a:p>
         </p:txBody>
       </p:sp>
       <p:pic>
         <p:nvPicPr>
-          <p:cNvPr id="125" name="Shape 125"/>
-          <p:cNvPicPr preferRelativeResize="0"/>
+          <p:cNvPr id="2" name="Picture 1"/>
+          <p:cNvPicPr>
+            <a:picLocks noChangeAspect="1"/>
+          </p:cNvPicPr>
           <p:nvPr/>
         </p:nvPicPr>
         <p:blipFill>
-          <a:blip r:embed="rId3">
-            <a:alphaModFix/>
-          </a:blip>
+          <a:blip r:embed="rId3"/>
           <a:stretch>
             <a:fillRect/>
           </a:stretch>
         </p:blipFill>
         <p:spPr>
           <a:xfrm>
-            <a:off x="610500" y="580379"/>
-            <a:ext cx="8216398" cy="5044244"/>
+            <a:off x="590595" y="457200"/>
+            <a:ext cx="8102009" cy="5208434"/>
           </a:xfrm>
           <a:prstGeom prst="rect">
             <a:avLst/>
           </a:prstGeom>
-          <a:noFill/>
-          <a:ln>
-            <a:noFill/>
-          </a:ln>
         </p:spPr>
       </p:pic>
     </p:spTree>
@@ -8768,7 +8765,7 @@
               <a:buChar char="●"/>
             </a:pPr>
             <a:r>
-              <a:rPr lang="en-US" sz="3600" b="1">
+              <a:rPr lang="en-US" sz="3600" b="1" dirty="0">
                 <a:solidFill>
                   <a:srgbClr val="FB6A18"/>
                 </a:solidFill>
@@ -8780,7 +8777,7 @@
               <a:t>Spark</a:t>
             </a:r>
             <a:r>
-              <a:rPr lang="en-US" sz="3600">
+              <a:rPr lang="en-US" sz="3600" dirty="0">
                 <a:solidFill>
                   <a:srgbClr val="042C4F"/>
                 </a:solidFill>
@@ -8811,7 +8808,7 @@
               <a:buChar char="●"/>
             </a:pPr>
             <a:r>
-              <a:rPr lang="en-US" sz="3600" b="1">
+              <a:rPr lang="en-US" sz="3600" b="1" dirty="0">
                 <a:solidFill>
                   <a:srgbClr val="FB6A18"/>
                 </a:solidFill>
@@ -8823,7 +8820,7 @@
               <a:t>Scheduler</a:t>
             </a:r>
             <a:r>
-              <a:rPr lang="en-US" sz="3600">
+              <a:rPr lang="en-US" sz="3600" dirty="0">
                 <a:solidFill>
                   <a:srgbClr val="042C4F"/>
                 </a:solidFill>
@@ -8854,7 +8851,7 @@
               <a:buChar char="●"/>
             </a:pPr>
             <a:r>
-              <a:rPr lang="en-US" sz="3600" b="1">
+              <a:rPr lang="en-US" sz="3600" b="1" dirty="0">
                 <a:solidFill>
                   <a:srgbClr val="FB6A18"/>
                 </a:solidFill>
@@ -8866,7 +8863,7 @@
               <a:t>Programming Language</a:t>
             </a:r>
             <a:r>
-              <a:rPr lang="en-US" sz="3600">
+              <a:rPr lang="en-US" sz="3600" dirty="0">
                 <a:solidFill>
                   <a:srgbClr val="042C4F"/>
                 </a:solidFill>
@@ -8897,7 +8894,7 @@
               <a:buChar char="●"/>
             </a:pPr>
             <a:r>
-              <a:rPr lang="en-US" sz="3600" b="1">
+              <a:rPr lang="en-US" sz="3600" b="1" dirty="0">
                 <a:solidFill>
                   <a:srgbClr val="FB6A18"/>
                 </a:solidFill>
@@ -8909,7 +8906,7 @@
               <a:t>Spark API</a:t>
             </a:r>
             <a:r>
-              <a:rPr lang="en-US" sz="3600">
+              <a:rPr lang="en-US" sz="3600" dirty="0">
                 <a:solidFill>
                   <a:srgbClr val="042C4F"/>
                 </a:solidFill>
@@ -8934,7 +8931,7 @@
               </a:spcAft>
               <a:buNone/>
             </a:pPr>
-            <a:endParaRPr/>
+            <a:endParaRPr dirty="0"/>
           </a:p>
         </p:txBody>
       </p:sp>
@@ -10227,7 +10224,7 @@
               <a:buNone/>
             </a:pPr>
             <a:r>
-              <a:rPr lang="en-US" sz="2400" b="1">
+              <a:rPr lang="en-US" sz="2400" b="1" dirty="0">
                 <a:latin typeface="Calibri"/>
                 <a:ea typeface="Calibri"/>
                 <a:cs typeface="Calibri"/>
@@ -10236,7 +10233,7 @@
               <a:t>Iterative machine learning in Spark: </a:t>
             </a:r>
             <a:r>
-              <a:rPr lang="en-US" sz="2400" u="sng">
+              <a:rPr lang="en-US" sz="2400" u="sng" dirty="0">
                 <a:solidFill>
                   <a:schemeClr val="hlink"/>
                 </a:solidFill>
@@ -10262,7 +10259,7 @@
               </a:spcAft>
               <a:buNone/>
             </a:pPr>
-            <a:endParaRPr sz="2400">
+            <a:endParaRPr sz="2400" dirty="0">
               <a:latin typeface="Calibri"/>
               <a:ea typeface="Calibri"/>
               <a:cs typeface="Calibri"/>
@@ -10283,7 +10280,7 @@
               <a:buNone/>
             </a:pPr>
             <a:r>
-              <a:rPr lang="en-US" sz="2400" b="1">
+              <a:rPr lang="en-US" sz="2400" b="1" dirty="0">
                 <a:latin typeface="Calibri"/>
                 <a:ea typeface="Calibri"/>
                 <a:cs typeface="Calibri"/>
@@ -10306,7 +10303,7 @@
               <a:buNone/>
             </a:pPr>
             <a:r>
-              <a:rPr lang="en-US" sz="2400" u="sng">
+              <a:rPr lang="en-US" sz="2400" u="sng" dirty="0">
                 <a:solidFill>
                   <a:schemeClr val="hlink"/>
                 </a:solidFill>
@@ -10332,7 +10329,7 @@
               </a:spcAft>
               <a:buNone/>
             </a:pPr>
-            <a:endParaRPr sz="2400">
+            <a:endParaRPr sz="2400" dirty="0">
               <a:latin typeface="Calibri"/>
               <a:ea typeface="Calibri"/>
               <a:cs typeface="Calibri"/>
@@ -10353,7 +10350,7 @@
               <a:buNone/>
             </a:pPr>
             <a:r>
-              <a:rPr lang="en-US" sz="2400" b="1">
+              <a:rPr lang="en-US" sz="2400" b="1" dirty="0">
                 <a:latin typeface="Calibri"/>
                 <a:ea typeface="Calibri"/>
                 <a:cs typeface="Calibri"/>
@@ -10376,14 +10373,51 @@
               <a:buNone/>
             </a:pPr>
             <a:r>
-              <a:rPr lang="en-US" sz="2400">
+              <a:rPr lang="en-US" sz="2400" dirty="0">
                 <a:latin typeface="Calibri"/>
                 <a:ea typeface="Calibri"/>
                 <a:cs typeface="Calibri"/>
                 <a:sym typeface="Calibri"/>
+                <a:hlinkClick r:id="rId5"/>
               </a:rPr>
-              <a:t>https://databricks.com/</a:t>
+              <a:t>https://databricks.com</a:t>
             </a:r>
+            <a:r>
+              <a:rPr lang="en-US" sz="2400" dirty="0" smtClean="0">
+                <a:latin typeface="Calibri"/>
+                <a:ea typeface="Calibri"/>
+                <a:cs typeface="Calibri"/>
+                <a:sym typeface="Calibri"/>
+                <a:hlinkClick r:id="rId5"/>
+              </a:rPr>
+              <a:t>/</a:t>
+            </a:r>
+            <a:endParaRPr lang="en-US" sz="2400" dirty="0" smtClean="0">
+              <a:latin typeface="Calibri"/>
+              <a:ea typeface="Calibri"/>
+              <a:cs typeface="Calibri"/>
+              <a:sym typeface="Calibri"/>
+            </a:endParaRPr>
+          </a:p>
+          <a:p>
+            <a:pPr marR="0" lvl="0" algn="l" rtl="0">
+              <a:lnSpc>
+                <a:spcPct val="90000"/>
+              </a:lnSpc>
+              <a:spcBef>
+                <a:spcPts val="0"/>
+              </a:spcBef>
+              <a:spcAft>
+                <a:spcPts val="0"/>
+              </a:spcAft>
+              <a:buNone/>
+            </a:pPr>
+            <a:endParaRPr lang="en-US" sz="2400" dirty="0">
+              <a:latin typeface="Calibri"/>
+              <a:ea typeface="Calibri"/>
+              <a:cs typeface="Calibri"/>
+              <a:sym typeface="Calibri"/>
+            </a:endParaRPr>
           </a:p>
         </p:txBody>
       </p:sp>
@@ -12860,7 +12894,7 @@
               <a:buChar char="●"/>
             </a:pPr>
             <a:r>
-              <a:rPr lang="en-US" sz="3600">
+              <a:rPr lang="en-US" sz="3600" dirty="0">
                 <a:solidFill>
                   <a:srgbClr val="042C4F"/>
                 </a:solidFill>
@@ -12891,7 +12925,7 @@
               <a:buChar char="●"/>
             </a:pPr>
             <a:r>
-              <a:rPr lang="en-US" sz="3600">
+              <a:rPr lang="en-US" sz="3600" dirty="0">
                 <a:solidFill>
                   <a:srgbClr val="042C4F"/>
                 </a:solidFill>
@@ -12900,29 +12934,10 @@
                 <a:cs typeface="Calibri"/>
                 <a:sym typeface="Calibri"/>
               </a:rPr>
-              <a:t>Machine learning: Spark can do iterative algorithms - ALS</a:t>
+              <a:t>Machine learning: Spark can do iterative algorithms </a:t>
             </a:r>
-          </a:p>
-          <a:p>
-            <a:pPr marL="457200" marR="0" lvl="0" indent="-457200" algn="l" rtl="0">
-              <a:lnSpc>
-                <a:spcPct val="100000"/>
-              </a:lnSpc>
-              <a:spcBef>
-                <a:spcPts val="0"/>
-              </a:spcBef>
-              <a:spcAft>
-                <a:spcPts val="0"/>
-              </a:spcAft>
-              <a:buClr>
-                <a:srgbClr val="042C4F"/>
-              </a:buClr>
-              <a:buSzPct val="100000"/>
-              <a:buFont typeface="Calibri"/>
-              <a:buChar char="●"/>
-            </a:pPr>
             <a:r>
-              <a:rPr lang="en-US" sz="3600">
+              <a:rPr lang="en-US" sz="3600" dirty="0" smtClean="0">
                 <a:solidFill>
                   <a:srgbClr val="042C4F"/>
                 </a:solidFill>
@@ -12931,29 +12946,10 @@
                 <a:cs typeface="Calibri"/>
                 <a:sym typeface="Calibri"/>
               </a:rPr>
-              <a:t>Graph calculations - GraphX</a:t>
+              <a:t>– ALS </a:t>
             </a:r>
-          </a:p>
-          <a:p>
-            <a:pPr marL="457200" marR="0" lvl="0" indent="-457200" algn="l" rtl="0">
-              <a:lnSpc>
-                <a:spcPct val="100000"/>
-              </a:lnSpc>
-              <a:spcBef>
-                <a:spcPts val="0"/>
-              </a:spcBef>
-              <a:spcAft>
-                <a:spcPts val="0"/>
-              </a:spcAft>
-              <a:buClr>
-                <a:srgbClr val="042C4F"/>
-              </a:buClr>
-              <a:buSzPct val="100000"/>
-              <a:buFont typeface="Calibri"/>
-              <a:buChar char="●"/>
-            </a:pPr>
             <a:r>
-              <a:rPr lang="en-US" sz="3600">
+              <a:rPr lang="en-US" sz="3600" dirty="0" err="1" smtClean="0">
                 <a:solidFill>
                   <a:srgbClr val="042C4F"/>
                 </a:solidFill>
@@ -12962,58 +12958,9 @@
                 <a:cs typeface="Calibri"/>
                 <a:sym typeface="Calibri"/>
               </a:rPr>
-              <a:t>Stream processing - online learning</a:t>
+              <a:t>etc</a:t>
             </a:r>
-          </a:p>
-          <a:p>
-            <a:pPr marL="457200" marR="0" lvl="0" indent="-457200" algn="l" rtl="0">
-              <a:lnSpc>
-                <a:spcPct val="100000"/>
-              </a:lnSpc>
-              <a:spcBef>
-                <a:spcPts val="0"/>
-              </a:spcBef>
-              <a:spcAft>
-                <a:spcPts val="0"/>
-              </a:spcAft>
-              <a:buClr>
-                <a:srgbClr val="042C4F"/>
-              </a:buClr>
-              <a:buSzPct val="100000"/>
-              <a:buFont typeface="Calibri"/>
-              <a:buChar char="●"/>
-            </a:pPr>
-            <a:r>
-              <a:rPr lang="en-US" sz="3600">
-                <a:solidFill>
-                  <a:srgbClr val="042C4F"/>
-                </a:solidFill>
-                <a:latin typeface="Calibri"/>
-                <a:ea typeface="Calibri"/>
-                <a:cs typeface="Calibri"/>
-                <a:sym typeface="Calibri"/>
-              </a:rPr>
-              <a:t>Scale! Thousands of nodes!</a:t>
-            </a:r>
-          </a:p>
-          <a:p>
-            <a:pPr marL="347472" marR="0" lvl="0" indent="-347472" algn="l" rtl="0">
-              <a:lnSpc>
-                <a:spcPct val="100000"/>
-              </a:lnSpc>
-              <a:spcBef>
-                <a:spcPts val="0"/>
-              </a:spcBef>
-              <a:spcAft>
-                <a:spcPts val="0"/>
-              </a:spcAft>
-              <a:buClr>
-                <a:schemeClr val="dk1"/>
-              </a:buClr>
-              <a:buFont typeface="Arial"/>
-              <a:buNone/>
-            </a:pPr>
-            <a:endParaRPr sz="1500" b="0" i="0" u="none" strike="noStrike" cap="none">
+            <a:endParaRPr lang="en-US" sz="3600" dirty="0">
               <a:solidFill>
                 <a:srgbClr val="042C4F"/>
               </a:solidFill>
@@ -13024,6 +12971,147 @@
             </a:endParaRPr>
           </a:p>
           <a:p>
+            <a:pPr marL="457200" marR="0" lvl="0" indent="-457200" algn="l" rtl="0">
+              <a:lnSpc>
+                <a:spcPct val="100000"/>
+              </a:lnSpc>
+              <a:spcBef>
+                <a:spcPts val="0"/>
+              </a:spcBef>
+              <a:spcAft>
+                <a:spcPts val="0"/>
+              </a:spcAft>
+              <a:buClr>
+                <a:srgbClr val="042C4F"/>
+              </a:buClr>
+              <a:buSzPct val="100000"/>
+              <a:buFont typeface="Calibri"/>
+              <a:buChar char="●"/>
+            </a:pPr>
+            <a:r>
+              <a:rPr lang="en-US" sz="3600" dirty="0">
+                <a:solidFill>
+                  <a:srgbClr val="042C4F"/>
+                </a:solidFill>
+                <a:latin typeface="Calibri"/>
+                <a:ea typeface="Calibri"/>
+                <a:cs typeface="Calibri"/>
+                <a:sym typeface="Calibri"/>
+              </a:rPr>
+              <a:t>Graph calculations - </a:t>
+            </a:r>
+            <a:r>
+              <a:rPr lang="en-US" sz="3600" dirty="0" err="1">
+                <a:solidFill>
+                  <a:srgbClr val="042C4F"/>
+                </a:solidFill>
+                <a:latin typeface="Calibri"/>
+                <a:ea typeface="Calibri"/>
+                <a:cs typeface="Calibri"/>
+                <a:sym typeface="Calibri"/>
+              </a:rPr>
+              <a:t>GraphX</a:t>
+            </a:r>
+            <a:endParaRPr lang="en-US" sz="3600" dirty="0">
+              <a:solidFill>
+                <a:srgbClr val="042C4F"/>
+              </a:solidFill>
+              <a:latin typeface="Calibri"/>
+              <a:ea typeface="Calibri"/>
+              <a:cs typeface="Calibri"/>
+              <a:sym typeface="Calibri"/>
+            </a:endParaRPr>
+          </a:p>
+          <a:p>
+            <a:pPr marL="457200" marR="0" lvl="0" indent="-457200" algn="l" rtl="0">
+              <a:lnSpc>
+                <a:spcPct val="100000"/>
+              </a:lnSpc>
+              <a:spcBef>
+                <a:spcPts val="0"/>
+              </a:spcBef>
+              <a:spcAft>
+                <a:spcPts val="0"/>
+              </a:spcAft>
+              <a:buClr>
+                <a:srgbClr val="042C4F"/>
+              </a:buClr>
+              <a:buSzPct val="100000"/>
+              <a:buFont typeface="Calibri"/>
+              <a:buChar char="●"/>
+            </a:pPr>
+            <a:r>
+              <a:rPr lang="en-US" sz="3600" dirty="0">
+                <a:solidFill>
+                  <a:srgbClr val="042C4F"/>
+                </a:solidFill>
+                <a:latin typeface="Calibri"/>
+                <a:ea typeface="Calibri"/>
+                <a:cs typeface="Calibri"/>
+                <a:sym typeface="Calibri"/>
+              </a:rPr>
+              <a:t>Stream processing - online learning</a:t>
+            </a:r>
+          </a:p>
+          <a:p>
+            <a:pPr marL="457200" marR="0" lvl="0" indent="-457200" algn="l" rtl="0">
+              <a:lnSpc>
+                <a:spcPct val="100000"/>
+              </a:lnSpc>
+              <a:spcBef>
+                <a:spcPts val="0"/>
+              </a:spcBef>
+              <a:spcAft>
+                <a:spcPts val="0"/>
+              </a:spcAft>
+              <a:buClr>
+                <a:srgbClr val="042C4F"/>
+              </a:buClr>
+              <a:buSzPct val="100000"/>
+              <a:buFont typeface="Calibri"/>
+              <a:buChar char="●"/>
+            </a:pPr>
+            <a:r>
+              <a:rPr lang="en-US" sz="3600" dirty="0">
+                <a:solidFill>
+                  <a:srgbClr val="042C4F"/>
+                </a:solidFill>
+                <a:latin typeface="Calibri"/>
+                <a:ea typeface="Calibri"/>
+                <a:cs typeface="Calibri"/>
+                <a:sym typeface="Calibri"/>
+              </a:rPr>
+              <a:t>Scale! Thousands of nodes!</a:t>
+            </a:r>
+          </a:p>
+          <a:p>
+            <a:pPr marL="347472" marR="0" lvl="0" indent="-347472" algn="l" rtl="0">
+              <a:lnSpc>
+                <a:spcPct val="100000"/>
+              </a:lnSpc>
+              <a:spcBef>
+                <a:spcPts val="0"/>
+              </a:spcBef>
+              <a:spcAft>
+                <a:spcPts val="0"/>
+              </a:spcAft>
+              <a:buClr>
+                <a:schemeClr val="dk1"/>
+              </a:buClr>
+              <a:buFont typeface="Arial"/>
+              <a:buNone/>
+            </a:pPr>
+            <a:endParaRPr sz="1500" b="0" i="0" u="none" strike="noStrike" cap="none" dirty="0">
+              <a:solidFill>
+                <a:srgbClr val="042C4F"/>
+              </a:solidFill>
+              <a:latin typeface="Calibri"/>
+              <a:ea typeface="Calibri"/>
+              <a:cs typeface="Calibri"/>
+              <a:sym typeface="Calibri"/>
+            </a:endParaRPr>
+          </a:p>
+          <a:p>
             <a:pPr marR="0" lvl="0" algn="l" rtl="0">
               <a:lnSpc>
                 <a:spcPct val="100000"/>
@@ -13036,7 +13124,7 @@
               </a:spcAft>
               <a:buNone/>
             </a:pPr>
-            <a:endParaRPr/>
+            <a:endParaRPr dirty="0"/>
           </a:p>
         </p:txBody>
       </p:sp>

</xml_diff>

<commit_message>
Nice examples and updates with word2vec
</commit_message>
<xml_diff>
--- a/Getting Started with Spark.pptx
+++ b/Getting Started with Spark.pptx
@@ -5,7 +5,7 @@
     <p:sldMasterId id="2147483659" r:id="rId1"/>
   </p:sldMasterIdLst>
   <p:notesMasterIdLst>
-    <p:notesMasterId r:id="rId20"/>
+    <p:notesMasterId r:id="rId24"/>
   </p:notesMasterIdLst>
   <p:sldIdLst>
     <p:sldId id="256" r:id="rId2"/>
@@ -25,21 +25,25 @@
     <p:sldId id="270" r:id="rId16"/>
     <p:sldId id="271" r:id="rId17"/>
     <p:sldId id="272" r:id="rId18"/>
-    <p:sldId id="273" r:id="rId19"/>
+    <p:sldId id="274" r:id="rId19"/>
+    <p:sldId id="275" r:id="rId20"/>
+    <p:sldId id="276" r:id="rId21"/>
+    <p:sldId id="277" r:id="rId22"/>
+    <p:sldId id="273" r:id="rId23"/>
   </p:sldIdLst>
   <p:sldSz cx="9144000" cy="6858000" type="screen4x3"/>
   <p:notesSz cx="6858000" cy="9144000"/>
   <p:embeddedFontLst>
     <p:embeddedFont>
-      <p:font typeface="Questrial" panose="020B0604020202020204" charset="0"/>
-      <p:regular r:id="rId21"/>
+      <p:font typeface="Calibri" panose="020F0502020204030204" pitchFamily="34" charset="0"/>
+      <p:regular r:id="rId25"/>
+      <p:bold r:id="rId26"/>
+      <p:italic r:id="rId27"/>
+      <p:boldItalic r:id="rId28"/>
     </p:embeddedFont>
     <p:embeddedFont>
-      <p:font typeface="Calibri" panose="020F0502020204030204" pitchFamily="34" charset="0"/>
-      <p:regular r:id="rId22"/>
-      <p:bold r:id="rId23"/>
-      <p:italic r:id="rId24"/>
-      <p:boldItalic r:id="rId25"/>
+      <p:font typeface="Questrial" panose="020B0604020202020204" charset="0"/>
+      <p:regular r:id="rId29"/>
     </p:embeddedFont>
   </p:embeddedFontLst>
   <p:defaultTextStyle>
@@ -2240,7 +2244,7 @@
   <p:cSld>
     <p:spTree>
       <p:nvGrpSpPr>
-        <p:cNvPr id="1" name="Shape 169"/>
+        <p:cNvPr id="1" name="Shape 163"/>
         <p:cNvGrpSpPr/>
         <p:nvPr/>
       </p:nvGrpSpPr>
@@ -2254,7 +2258,7 @@
       </p:grpSpPr>
       <p:sp>
         <p:nvSpPr>
-          <p:cNvPr id="170" name="Shape 170"/>
+          <p:cNvPr id="164" name="Shape 164"/>
           <p:cNvSpPr txBox="1">
             <a:spLocks noGrp="1"/>
           </p:cNvSpPr>
@@ -2283,7 +2287,10 @@
               </a:spcBef>
               <a:buNone/>
             </a:pPr>
-            <a:endParaRPr/>
+            <a:r>
+              <a:rPr lang="en-US"/>
+              <a:t>To Jupyter Notebook</a:t>
+            </a:r>
           </a:p>
           <a:p>
             <a:pPr lvl="0" rtl="0">
@@ -2298,7 +2305,7 @@
       </p:sp>
       <p:sp>
         <p:nvSpPr>
-          <p:cNvPr id="171" name="Shape 171"/>
+          <p:cNvPr id="165" name="Shape 165"/>
           <p:cNvSpPr>
             <a:spLocks noGrp="1" noRot="1" noChangeAspect="1"/>
           </p:cNvSpPr>
@@ -2340,7 +2347,125 @@
     </p:spTree>
     <p:extLst>
       <p:ext uri="{BB962C8B-B14F-4D97-AF65-F5344CB8AC3E}">
-        <p14:creationId xmlns:p14="http://schemas.microsoft.com/office/powerpoint/2010/main" val="3369764488"/>
+        <p14:creationId xmlns:p14="http://schemas.microsoft.com/office/powerpoint/2010/main" val="2269621126"/>
+      </p:ext>
+    </p:extLst>
+  </p:cSld>
+  <p:clrMapOvr>
+    <a:masterClrMapping/>
+  </p:clrMapOvr>
+</p:notes>
+</file>
+
+<file path=ppt/notesSlides/notesSlide19.xml><?xml version="1.0" encoding="utf-8"?>
+<p:notes xmlns:a="http://schemas.openxmlformats.org/drawingml/2006/main" xmlns:r="http://schemas.openxmlformats.org/officeDocument/2006/relationships" xmlns:p="http://schemas.openxmlformats.org/presentationml/2006/main" showMasterSp="0" showMasterPhAnim="0">
+  <p:cSld>
+    <p:spTree>
+      <p:nvGrpSpPr>
+        <p:cNvPr id="1" name="Shape 163"/>
+        <p:cNvGrpSpPr/>
+        <p:nvPr/>
+      </p:nvGrpSpPr>
+      <p:grpSpPr>
+        <a:xfrm>
+          <a:off x="0" y="0"/>
+          <a:ext cx="0" cy="0"/>
+          <a:chOff x="0" y="0"/>
+          <a:chExt cx="0" cy="0"/>
+        </a:xfrm>
+      </p:grpSpPr>
+      <p:sp>
+        <p:nvSpPr>
+          <p:cNvPr id="164" name="Shape 164"/>
+          <p:cNvSpPr txBox="1">
+            <a:spLocks noGrp="1"/>
+          </p:cNvSpPr>
+          <p:nvPr>
+            <p:ph type="body" idx="1"/>
+          </p:nvPr>
+        </p:nvSpPr>
+        <p:spPr>
+          <a:xfrm>
+            <a:off x="685800" y="4343400"/>
+            <a:ext cx="5486400" cy="4114800"/>
+          </a:xfrm>
+          <a:prstGeom prst="rect">
+            <a:avLst/>
+          </a:prstGeom>
+        </p:spPr>
+        <p:txBody>
+          <a:bodyPr lIns="91425" tIns="91425" rIns="91425" bIns="91425" anchor="t" anchorCtr="0">
+            <a:noAutofit/>
+          </a:bodyPr>
+          <a:lstStyle/>
+          <a:p>
+            <a:pPr lvl="0" rtl="0">
+              <a:spcBef>
+                <a:spcPts val="0"/>
+              </a:spcBef>
+              <a:buNone/>
+            </a:pPr>
+            <a:r>
+              <a:rPr lang="en-US"/>
+              <a:t>To Jupyter Notebook</a:t>
+            </a:r>
+          </a:p>
+          <a:p>
+            <a:pPr lvl="0" rtl="0">
+              <a:spcBef>
+                <a:spcPts val="0"/>
+              </a:spcBef>
+              <a:buNone/>
+            </a:pPr>
+            <a:endParaRPr/>
+          </a:p>
+        </p:txBody>
+      </p:sp>
+      <p:sp>
+        <p:nvSpPr>
+          <p:cNvPr id="165" name="Shape 165"/>
+          <p:cNvSpPr>
+            <a:spLocks noGrp="1" noRot="1" noChangeAspect="1"/>
+          </p:cNvSpPr>
+          <p:nvPr>
+            <p:ph type="sldImg" idx="2"/>
+          </p:nvPr>
+        </p:nvSpPr>
+        <p:spPr>
+          <a:xfrm>
+            <a:off x="1143000" y="685800"/>
+            <a:ext cx="4572000" cy="3429000"/>
+          </a:xfrm>
+          <a:custGeom>
+            <a:avLst/>
+            <a:gdLst/>
+            <a:ahLst/>
+            <a:cxnLst/>
+            <a:rect l="0" t="0" r="0" b="0"/>
+            <a:pathLst>
+              <a:path w="120000" h="120000" extrusionOk="0">
+                <a:moveTo>
+                  <a:pt x="0" y="0"/>
+                </a:moveTo>
+                <a:lnTo>
+                  <a:pt x="120000" y="0"/>
+                </a:lnTo>
+                <a:lnTo>
+                  <a:pt x="120000" y="120000"/>
+                </a:lnTo>
+                <a:lnTo>
+                  <a:pt x="0" y="120000"/>
+                </a:lnTo>
+                <a:close/>
+              </a:path>
+            </a:pathLst>
+          </a:custGeom>
+        </p:spPr>
+      </p:sp>
+    </p:spTree>
+    <p:extLst>
+      <p:ext uri="{BB962C8B-B14F-4D97-AF65-F5344CB8AC3E}">
+        <p14:creationId xmlns:p14="http://schemas.microsoft.com/office/powerpoint/2010/main" val="1487646201"/>
       </p:ext>
     </p:extLst>
   </p:cSld>
@@ -2533,6 +2658,357 @@
     <p:extLst>
       <p:ext uri="{BB962C8B-B14F-4D97-AF65-F5344CB8AC3E}">
         <p14:creationId xmlns:p14="http://schemas.microsoft.com/office/powerpoint/2010/main" val="1631318367"/>
+      </p:ext>
+    </p:extLst>
+  </p:cSld>
+  <p:clrMapOvr>
+    <a:masterClrMapping/>
+  </p:clrMapOvr>
+</p:notes>
+</file>
+
+<file path=ppt/notesSlides/notesSlide20.xml><?xml version="1.0" encoding="utf-8"?>
+<p:notes xmlns:a="http://schemas.openxmlformats.org/drawingml/2006/main" xmlns:r="http://schemas.openxmlformats.org/officeDocument/2006/relationships" xmlns:p="http://schemas.openxmlformats.org/presentationml/2006/main" showMasterSp="0" showMasterPhAnim="0">
+  <p:cSld>
+    <p:spTree>
+      <p:nvGrpSpPr>
+        <p:cNvPr id="1" name="Shape 163"/>
+        <p:cNvGrpSpPr/>
+        <p:nvPr/>
+      </p:nvGrpSpPr>
+      <p:grpSpPr>
+        <a:xfrm>
+          <a:off x="0" y="0"/>
+          <a:ext cx="0" cy="0"/>
+          <a:chOff x="0" y="0"/>
+          <a:chExt cx="0" cy="0"/>
+        </a:xfrm>
+      </p:grpSpPr>
+      <p:sp>
+        <p:nvSpPr>
+          <p:cNvPr id="164" name="Shape 164"/>
+          <p:cNvSpPr txBox="1">
+            <a:spLocks noGrp="1"/>
+          </p:cNvSpPr>
+          <p:nvPr>
+            <p:ph type="body" idx="1"/>
+          </p:nvPr>
+        </p:nvSpPr>
+        <p:spPr>
+          <a:xfrm>
+            <a:off x="685800" y="4343400"/>
+            <a:ext cx="5486400" cy="4114800"/>
+          </a:xfrm>
+          <a:prstGeom prst="rect">
+            <a:avLst/>
+          </a:prstGeom>
+        </p:spPr>
+        <p:txBody>
+          <a:bodyPr lIns="91425" tIns="91425" rIns="91425" bIns="91425" anchor="t" anchorCtr="0">
+            <a:noAutofit/>
+          </a:bodyPr>
+          <a:lstStyle/>
+          <a:p>
+            <a:pPr lvl="0" rtl="0">
+              <a:spcBef>
+                <a:spcPts val="0"/>
+              </a:spcBef>
+              <a:buNone/>
+            </a:pPr>
+            <a:r>
+              <a:rPr lang="en-US"/>
+              <a:t>To Jupyter Notebook</a:t>
+            </a:r>
+          </a:p>
+          <a:p>
+            <a:pPr lvl="0" rtl="0">
+              <a:spcBef>
+                <a:spcPts val="0"/>
+              </a:spcBef>
+              <a:buNone/>
+            </a:pPr>
+            <a:endParaRPr/>
+          </a:p>
+        </p:txBody>
+      </p:sp>
+      <p:sp>
+        <p:nvSpPr>
+          <p:cNvPr id="165" name="Shape 165"/>
+          <p:cNvSpPr>
+            <a:spLocks noGrp="1" noRot="1" noChangeAspect="1"/>
+          </p:cNvSpPr>
+          <p:nvPr>
+            <p:ph type="sldImg" idx="2"/>
+          </p:nvPr>
+        </p:nvSpPr>
+        <p:spPr>
+          <a:xfrm>
+            <a:off x="1143000" y="685800"/>
+            <a:ext cx="4572000" cy="3429000"/>
+          </a:xfrm>
+          <a:custGeom>
+            <a:avLst/>
+            <a:gdLst/>
+            <a:ahLst/>
+            <a:cxnLst/>
+            <a:rect l="0" t="0" r="0" b="0"/>
+            <a:pathLst>
+              <a:path w="120000" h="120000" extrusionOk="0">
+                <a:moveTo>
+                  <a:pt x="0" y="0"/>
+                </a:moveTo>
+                <a:lnTo>
+                  <a:pt x="120000" y="0"/>
+                </a:lnTo>
+                <a:lnTo>
+                  <a:pt x="120000" y="120000"/>
+                </a:lnTo>
+                <a:lnTo>
+                  <a:pt x="0" y="120000"/>
+                </a:lnTo>
+                <a:close/>
+              </a:path>
+            </a:pathLst>
+          </a:custGeom>
+        </p:spPr>
+      </p:sp>
+    </p:spTree>
+    <p:extLst>
+      <p:ext uri="{BB962C8B-B14F-4D97-AF65-F5344CB8AC3E}">
+        <p14:creationId xmlns:p14="http://schemas.microsoft.com/office/powerpoint/2010/main" val="2347403224"/>
+      </p:ext>
+    </p:extLst>
+  </p:cSld>
+  <p:clrMapOvr>
+    <a:masterClrMapping/>
+  </p:clrMapOvr>
+</p:notes>
+</file>
+
+<file path=ppt/notesSlides/notesSlide21.xml><?xml version="1.0" encoding="utf-8"?>
+<p:notes xmlns:a="http://schemas.openxmlformats.org/drawingml/2006/main" xmlns:r="http://schemas.openxmlformats.org/officeDocument/2006/relationships" xmlns:p="http://schemas.openxmlformats.org/presentationml/2006/main" showMasterSp="0" showMasterPhAnim="0">
+  <p:cSld>
+    <p:spTree>
+      <p:nvGrpSpPr>
+        <p:cNvPr id="1" name="Shape 163"/>
+        <p:cNvGrpSpPr/>
+        <p:nvPr/>
+      </p:nvGrpSpPr>
+      <p:grpSpPr>
+        <a:xfrm>
+          <a:off x="0" y="0"/>
+          <a:ext cx="0" cy="0"/>
+          <a:chOff x="0" y="0"/>
+          <a:chExt cx="0" cy="0"/>
+        </a:xfrm>
+      </p:grpSpPr>
+      <p:sp>
+        <p:nvSpPr>
+          <p:cNvPr id="164" name="Shape 164"/>
+          <p:cNvSpPr txBox="1">
+            <a:spLocks noGrp="1"/>
+          </p:cNvSpPr>
+          <p:nvPr>
+            <p:ph type="body" idx="1"/>
+          </p:nvPr>
+        </p:nvSpPr>
+        <p:spPr>
+          <a:xfrm>
+            <a:off x="685800" y="4343400"/>
+            <a:ext cx="5486400" cy="4114800"/>
+          </a:xfrm>
+          <a:prstGeom prst="rect">
+            <a:avLst/>
+          </a:prstGeom>
+        </p:spPr>
+        <p:txBody>
+          <a:bodyPr lIns="91425" tIns="91425" rIns="91425" bIns="91425" anchor="t" anchorCtr="0">
+            <a:noAutofit/>
+          </a:bodyPr>
+          <a:lstStyle/>
+          <a:p>
+            <a:pPr lvl="0" rtl="0">
+              <a:spcBef>
+                <a:spcPts val="0"/>
+              </a:spcBef>
+              <a:buNone/>
+            </a:pPr>
+            <a:r>
+              <a:rPr lang="en-US"/>
+              <a:t>To Jupyter Notebook</a:t>
+            </a:r>
+          </a:p>
+          <a:p>
+            <a:pPr lvl="0" rtl="0">
+              <a:spcBef>
+                <a:spcPts val="0"/>
+              </a:spcBef>
+              <a:buNone/>
+            </a:pPr>
+            <a:endParaRPr/>
+          </a:p>
+        </p:txBody>
+      </p:sp>
+      <p:sp>
+        <p:nvSpPr>
+          <p:cNvPr id="165" name="Shape 165"/>
+          <p:cNvSpPr>
+            <a:spLocks noGrp="1" noRot="1" noChangeAspect="1"/>
+          </p:cNvSpPr>
+          <p:nvPr>
+            <p:ph type="sldImg" idx="2"/>
+          </p:nvPr>
+        </p:nvSpPr>
+        <p:spPr>
+          <a:xfrm>
+            <a:off x="1143000" y="685800"/>
+            <a:ext cx="4572000" cy="3429000"/>
+          </a:xfrm>
+          <a:custGeom>
+            <a:avLst/>
+            <a:gdLst/>
+            <a:ahLst/>
+            <a:cxnLst/>
+            <a:rect l="0" t="0" r="0" b="0"/>
+            <a:pathLst>
+              <a:path w="120000" h="120000" extrusionOk="0">
+                <a:moveTo>
+                  <a:pt x="0" y="0"/>
+                </a:moveTo>
+                <a:lnTo>
+                  <a:pt x="120000" y="0"/>
+                </a:lnTo>
+                <a:lnTo>
+                  <a:pt x="120000" y="120000"/>
+                </a:lnTo>
+                <a:lnTo>
+                  <a:pt x="0" y="120000"/>
+                </a:lnTo>
+                <a:close/>
+              </a:path>
+            </a:pathLst>
+          </a:custGeom>
+        </p:spPr>
+      </p:sp>
+    </p:spTree>
+    <p:extLst>
+      <p:ext uri="{BB962C8B-B14F-4D97-AF65-F5344CB8AC3E}">
+        <p14:creationId xmlns:p14="http://schemas.microsoft.com/office/powerpoint/2010/main" val="2442248266"/>
+      </p:ext>
+    </p:extLst>
+  </p:cSld>
+  <p:clrMapOvr>
+    <a:masterClrMapping/>
+  </p:clrMapOvr>
+</p:notes>
+</file>
+
+<file path=ppt/notesSlides/notesSlide22.xml><?xml version="1.0" encoding="utf-8"?>
+<p:notes xmlns:a="http://schemas.openxmlformats.org/drawingml/2006/main" xmlns:r="http://schemas.openxmlformats.org/officeDocument/2006/relationships" xmlns:p="http://schemas.openxmlformats.org/presentationml/2006/main" showMasterSp="0" showMasterPhAnim="0">
+  <p:cSld>
+    <p:spTree>
+      <p:nvGrpSpPr>
+        <p:cNvPr id="1" name="Shape 169"/>
+        <p:cNvGrpSpPr/>
+        <p:nvPr/>
+      </p:nvGrpSpPr>
+      <p:grpSpPr>
+        <a:xfrm>
+          <a:off x="0" y="0"/>
+          <a:ext cx="0" cy="0"/>
+          <a:chOff x="0" y="0"/>
+          <a:chExt cx="0" cy="0"/>
+        </a:xfrm>
+      </p:grpSpPr>
+      <p:sp>
+        <p:nvSpPr>
+          <p:cNvPr id="170" name="Shape 170"/>
+          <p:cNvSpPr txBox="1">
+            <a:spLocks noGrp="1"/>
+          </p:cNvSpPr>
+          <p:nvPr>
+            <p:ph type="body" idx="1"/>
+          </p:nvPr>
+        </p:nvSpPr>
+        <p:spPr>
+          <a:xfrm>
+            <a:off x="685800" y="4343400"/>
+            <a:ext cx="5486400" cy="4114800"/>
+          </a:xfrm>
+          <a:prstGeom prst="rect">
+            <a:avLst/>
+          </a:prstGeom>
+        </p:spPr>
+        <p:txBody>
+          <a:bodyPr lIns="91425" tIns="91425" rIns="91425" bIns="91425" anchor="t" anchorCtr="0">
+            <a:noAutofit/>
+          </a:bodyPr>
+          <a:lstStyle/>
+          <a:p>
+            <a:pPr lvl="0" rtl="0">
+              <a:spcBef>
+                <a:spcPts val="0"/>
+              </a:spcBef>
+              <a:buNone/>
+            </a:pPr>
+            <a:endParaRPr/>
+          </a:p>
+          <a:p>
+            <a:pPr lvl="0" rtl="0">
+              <a:spcBef>
+                <a:spcPts val="0"/>
+              </a:spcBef>
+              <a:buNone/>
+            </a:pPr>
+            <a:endParaRPr/>
+          </a:p>
+        </p:txBody>
+      </p:sp>
+      <p:sp>
+        <p:nvSpPr>
+          <p:cNvPr id="171" name="Shape 171"/>
+          <p:cNvSpPr>
+            <a:spLocks noGrp="1" noRot="1" noChangeAspect="1"/>
+          </p:cNvSpPr>
+          <p:nvPr>
+            <p:ph type="sldImg" idx="2"/>
+          </p:nvPr>
+        </p:nvSpPr>
+        <p:spPr>
+          <a:xfrm>
+            <a:off x="1143000" y="685800"/>
+            <a:ext cx="4572000" cy="3429000"/>
+          </a:xfrm>
+          <a:custGeom>
+            <a:avLst/>
+            <a:gdLst/>
+            <a:ahLst/>
+            <a:cxnLst/>
+            <a:rect l="0" t="0" r="0" b="0"/>
+            <a:pathLst>
+              <a:path w="120000" h="120000" extrusionOk="0">
+                <a:moveTo>
+                  <a:pt x="0" y="0"/>
+                </a:moveTo>
+                <a:lnTo>
+                  <a:pt x="120000" y="0"/>
+                </a:lnTo>
+                <a:lnTo>
+                  <a:pt x="120000" y="120000"/>
+                </a:lnTo>
+                <a:lnTo>
+                  <a:pt x="0" y="120000"/>
+                </a:lnTo>
+                <a:close/>
+              </a:path>
+            </a:pathLst>
+          </a:custGeom>
+        </p:spPr>
+      </p:sp>
+    </p:spTree>
+    <p:extLst>
+      <p:ext uri="{BB962C8B-B14F-4D97-AF65-F5344CB8AC3E}">
+        <p14:creationId xmlns:p14="http://schemas.microsoft.com/office/powerpoint/2010/main" val="3369764488"/>
       </p:ext>
     </p:extLst>
   </p:cSld>
@@ -8231,9 +8707,13 @@
               <a:buNone/>
             </a:pPr>
             <a:r>
-              <a:rPr lang="en-US" sz="3000" b="1"/>
-              <a:t>https://github.com/dsiufl/Spark-Workshop</a:t>
+              <a:rPr lang="en-US" sz="3000" b="1" dirty="0" smtClean="0"/>
+              <a:t>http://elk.acis.ufl.edu</a:t>
             </a:r>
+            <a:r>
+              <a:rPr lang="en-US" sz="3000" b="1" dirty="0" smtClean="0"/>
+              <a:t>/Spark-Workshop/</a:t>
+            </a:r>
           </a:p>
           <a:p>
             <a:pPr lvl="0">
@@ -8242,10 +8722,20 @@
               </a:spcBef>
               <a:buNone/>
             </a:pPr>
+            <a:endParaRPr lang="en-US" sz="3000" b="1" dirty="0"/>
+          </a:p>
+          <a:p>
+            <a:pPr lvl="0">
+              <a:spcBef>
+                <a:spcPts val="0"/>
+              </a:spcBef>
+              <a:buNone/>
+            </a:pPr>
             <a:r>
-              <a:rPr lang="en-US" sz="3000"/>
-              <a:t>Download as Raw to your SparkWorkshop folder: </a:t>
+              <a:rPr lang="en-US" sz="3000" i="1" dirty="0" err="1" smtClean="0"/>
+              <a:t>Spark_Workshop_Notebook.ipynb</a:t>
             </a:r>
+            <a:endParaRPr lang="en-US" sz="3000" i="1" dirty="0"/>
           </a:p>
           <a:p>
             <a:pPr lvl="0">
@@ -8255,9 +8745,14 @@
               <a:buNone/>
             </a:pPr>
             <a:r>
-              <a:rPr lang="en-US" sz="3000"/>
-              <a:t>    Spark_Workshop_Notebook.ipynb</a:t>
+              <a:rPr lang="en-US" sz="3000" i="1" dirty="0"/>
+              <a:t>d</a:t>
             </a:r>
+            <a:r>
+              <a:rPr lang="en-US" sz="3000" i="1" dirty="0" smtClean="0"/>
+              <a:t>ata/hacker_news_100k.json.gz</a:t>
+            </a:r>
+            <a:endParaRPr lang="en-US" sz="3000" i="1" dirty="0"/>
           </a:p>
           <a:p>
             <a:pPr lvl="0">
@@ -8266,19 +8761,7 @@
               </a:spcBef>
               <a:buNone/>
             </a:pPr>
-            <a:r>
-              <a:rPr lang="en-US" sz="3000"/>
-              <a:t>    data/hacker_news_small.json</a:t>
-            </a:r>
-          </a:p>
-          <a:p>
-            <a:pPr lvl="0">
-              <a:spcBef>
-                <a:spcPts val="0"/>
-              </a:spcBef>
-              <a:buNone/>
-            </a:pPr>
-            <a:endParaRPr sz="3000"/>
+            <a:endParaRPr sz="3000" dirty="0"/>
           </a:p>
           <a:p>
             <a:pPr lvl="0" rtl="0">
@@ -8287,7 +8770,7 @@
               </a:spcBef>
               <a:buNone/>
             </a:pPr>
-            <a:endParaRPr sz="3000"/>
+            <a:endParaRPr sz="3000" dirty="0"/>
           </a:p>
         </p:txBody>
       </p:sp>
@@ -8300,7 +8783,7 @@
         <p:spPr>
           <a:xfrm>
             <a:off x="533400" y="457200"/>
-            <a:ext cx="6476999" cy="769500"/>
+            <a:ext cx="8244840" cy="769500"/>
           </a:xfrm>
           <a:prstGeom prst="rect">
             <a:avLst/>
@@ -8327,7 +8810,7 @@
               <a:buNone/>
             </a:pPr>
             <a:r>
-              <a:rPr lang="en-US" sz="4400">
+              <a:rPr lang="en-US" sz="4400" dirty="0">
                 <a:solidFill>
                   <a:srgbClr val="1A496C"/>
                 </a:solidFill>
@@ -8336,37 +8819,54 @@
                 <a:cs typeface="Questrial"/>
                 <a:sym typeface="Questrial"/>
               </a:rPr>
-              <a:t>Today’s Dataset</a:t>
+              <a:t>Today’s </a:t>
             </a:r>
+            <a:r>
+              <a:rPr lang="en-US" sz="4400" dirty="0" smtClean="0">
+                <a:solidFill>
+                  <a:srgbClr val="1A496C"/>
+                </a:solidFill>
+                <a:latin typeface="Questrial"/>
+                <a:ea typeface="Questrial"/>
+                <a:cs typeface="Questrial"/>
+                <a:sym typeface="Questrial"/>
+              </a:rPr>
+              <a:t>Dataset and Notebook</a:t>
+            </a:r>
+            <a:endParaRPr lang="en-US" sz="4400" dirty="0">
+              <a:solidFill>
+                <a:srgbClr val="1A496C"/>
+              </a:solidFill>
+              <a:latin typeface="Questrial"/>
+              <a:ea typeface="Questrial"/>
+              <a:cs typeface="Questrial"/>
+              <a:sym typeface="Questrial"/>
+            </a:endParaRPr>
           </a:p>
         </p:txBody>
       </p:sp>
       <p:pic>
         <p:nvPicPr>
-          <p:cNvPr id="55" name="Shape 55"/>
-          <p:cNvPicPr preferRelativeResize="0"/>
+          <p:cNvPr id="2" name="Picture 1"/>
+          <p:cNvPicPr>
+            <a:picLocks noChangeAspect="1"/>
+          </p:cNvPicPr>
           <p:nvPr/>
         </p:nvPicPr>
         <p:blipFill>
-          <a:blip r:embed="rId3">
-            <a:alphaModFix/>
-          </a:blip>
+          <a:blip r:embed="rId3"/>
           <a:stretch>
             <a:fillRect/>
           </a:stretch>
         </p:blipFill>
         <p:spPr>
           <a:xfrm>
-            <a:off x="1018875" y="4136234"/>
-            <a:ext cx="6725250" cy="2604024"/>
+            <a:off x="1490133" y="3822866"/>
+            <a:ext cx="7513955" cy="3184147"/>
           </a:xfrm>
           <a:prstGeom prst="rect">
             <a:avLst/>
           </a:prstGeom>
-          <a:noFill/>
-          <a:ln>
-            <a:noFill/>
-          </a:ln>
         </p:spPr>
       </p:pic>
     </p:spTree>
@@ -8492,7 +8992,6 @@
               <a:rPr lang="en-US" b="1" dirty="0"/>
               <a:t>https://trends.google.com/trends/explore?q=Apache%20Hadoop,Apache%20Spark</a:t>
             </a:r>
-            <a:endParaRPr lang="en-US" b="1" dirty="0"/>
           </a:p>
         </p:txBody>
       </p:sp>
@@ -10174,7 +10673,7 @@
     </p:bg>
     <p:spTree>
       <p:nvGrpSpPr>
-        <p:cNvPr id="1" name="Shape 172"/>
+        <p:cNvPr id="1" name="Shape 166"/>
         <p:cNvGrpSpPr/>
         <p:nvPr/>
       </p:nvGrpSpPr>
@@ -10188,7 +10687,7 @@
       </p:grpSpPr>
       <p:sp>
         <p:nvSpPr>
-          <p:cNvPr id="173" name="Shape 173"/>
+          <p:cNvPr id="167" name="Shape 167"/>
           <p:cNvSpPr txBox="1"/>
           <p:nvPr/>
         </p:nvSpPr>
@@ -10223,27 +10722,60 @@
               </a:spcAft>
               <a:buNone/>
             </a:pPr>
+            <a:endParaRPr sz="3600" b="1" dirty="0">
+              <a:solidFill>
+                <a:srgbClr val="FB6A18"/>
+              </a:solidFill>
+              <a:latin typeface="Calibri"/>
+              <a:ea typeface="Calibri"/>
+              <a:cs typeface="Calibri"/>
+              <a:sym typeface="Calibri"/>
+            </a:endParaRPr>
+          </a:p>
+          <a:p>
+            <a:pPr marR="0" lvl="0" algn="l" rtl="0">
+              <a:lnSpc>
+                <a:spcPct val="90000"/>
+              </a:lnSpc>
+              <a:spcBef>
+                <a:spcPts val="0"/>
+              </a:spcBef>
+              <a:spcAft>
+                <a:spcPts val="0"/>
+              </a:spcAft>
+              <a:buNone/>
+            </a:pPr>
+            <a:endParaRPr sz="3600" b="1" dirty="0">
+              <a:solidFill>
+                <a:srgbClr val="FB6A18"/>
+              </a:solidFill>
+              <a:latin typeface="Calibri"/>
+              <a:ea typeface="Calibri"/>
+              <a:cs typeface="Calibri"/>
+              <a:sym typeface="Calibri"/>
+            </a:endParaRPr>
+          </a:p>
+          <a:p>
+            <a:pPr marR="0" lvl="0" algn="l" rtl="0">
+              <a:lnSpc>
+                <a:spcPct val="90000"/>
+              </a:lnSpc>
+              <a:spcBef>
+                <a:spcPts val="0"/>
+              </a:spcBef>
+              <a:spcAft>
+                <a:spcPts val="0"/>
+              </a:spcAft>
+              <a:buNone/>
+            </a:pPr>
             <a:r>
-              <a:rPr lang="en-US" sz="2400" b="1" dirty="0">
+              <a:rPr lang="en-US" sz="3600" dirty="0" smtClean="0">
                 <a:latin typeface="Calibri"/>
                 <a:ea typeface="Calibri"/>
                 <a:cs typeface="Calibri"/>
                 <a:sym typeface="Calibri"/>
               </a:rPr>
-              <a:t>Iterative machine learning in Spark: </a:t>
-            </a:r>
-            <a:r>
-              <a:rPr lang="en-US" sz="2400" u="sng" dirty="0">
-                <a:solidFill>
-                  <a:schemeClr val="hlink"/>
-                </a:solidFill>
-                <a:latin typeface="Calibri"/>
-                <a:ea typeface="Calibri"/>
-                <a:cs typeface="Calibri"/>
-                <a:sym typeface="Calibri"/>
-                <a:hlinkClick r:id="rId3"/>
-              </a:rPr>
-              <a:t>https://www.mapr.com/blog/parallel-and-iterative-processing-machine-learning-recommendations-spark</a:t>
+              <a:t>Math with words!</a:t>
             </a:r>
           </a:p>
           <a:p>
@@ -10259,7 +10791,7 @@
               </a:spcAft>
               <a:buNone/>
             </a:pPr>
-            <a:endParaRPr sz="2400" dirty="0">
+            <a:endParaRPr lang="en-US" sz="3600" b="1" dirty="0">
               <a:latin typeface="Calibri"/>
               <a:ea typeface="Calibri"/>
               <a:cs typeface="Calibri"/>
@@ -10280,13 +10812,22 @@
               <a:buNone/>
             </a:pPr>
             <a:r>
-              <a:rPr lang="en-US" sz="2400" b="1" dirty="0">
+              <a:rPr lang="en-US" sz="3600" b="1" dirty="0" smtClean="0">
                 <a:latin typeface="Calibri"/>
                 <a:ea typeface="Calibri"/>
                 <a:cs typeface="Calibri"/>
                 <a:sym typeface="Calibri"/>
               </a:rPr>
-              <a:t>Spark Python API Documentation:</a:t>
+              <a:t>Represent words as vectors in a hig</a:t>
+            </a:r>
+            <a:r>
+              <a:rPr lang="en-US" sz="3600" b="1" dirty="0" smtClean="0">
+                <a:latin typeface="Calibri"/>
+                <a:ea typeface="Calibri"/>
+                <a:cs typeface="Calibri"/>
+                <a:sym typeface="Calibri"/>
+              </a:rPr>
+              <a:t>h (but not too high) dimension such that similar words are pointing in similar directions*</a:t>
             </a:r>
           </a:p>
           <a:p>
@@ -10302,34 +10843,7 @@
               </a:spcAft>
               <a:buNone/>
             </a:pPr>
-            <a:r>
-              <a:rPr lang="en-US" sz="2400" u="sng" dirty="0">
-                <a:solidFill>
-                  <a:schemeClr val="hlink"/>
-                </a:solidFill>
-                <a:latin typeface="Calibri"/>
-                <a:ea typeface="Calibri"/>
-                <a:cs typeface="Calibri"/>
-                <a:sym typeface="Calibri"/>
-                <a:hlinkClick r:id="rId4"/>
-              </a:rPr>
-              <a:t>http://spark.apache.org/docs/latest/api/python/</a:t>
-            </a:r>
-          </a:p>
-          <a:p>
-            <a:pPr marR="0" lvl="0" algn="l" rtl="0">
-              <a:lnSpc>
-                <a:spcPct val="90000"/>
-              </a:lnSpc>
-              <a:spcBef>
-                <a:spcPts val="0"/>
-              </a:spcBef>
-              <a:spcAft>
-                <a:spcPts val="0"/>
-              </a:spcAft>
-              <a:buNone/>
-            </a:pPr>
-            <a:endParaRPr sz="2400" dirty="0">
+            <a:endParaRPr lang="en-US" sz="3600" b="1" dirty="0">
               <a:latin typeface="Calibri"/>
               <a:ea typeface="Calibri"/>
               <a:cs typeface="Calibri"/>
@@ -10350,80 +10864,26 @@
               <a:buNone/>
             </a:pPr>
             <a:r>
-              <a:rPr lang="en-US" sz="2400" b="1" dirty="0">
+              <a:rPr lang="en-US" sz="2800" b="1" dirty="0" smtClean="0">
                 <a:latin typeface="Calibri"/>
                 <a:ea typeface="Calibri"/>
                 <a:cs typeface="Calibri"/>
                 <a:sym typeface="Calibri"/>
               </a:rPr>
-              <a:t>Company that employs Spark’s creator:</a:t>
+              <a:t>* Their cosine distance is small</a:t>
             </a:r>
-          </a:p>
-          <a:p>
-            <a:pPr marR="0" lvl="0" algn="l" rtl="0">
-              <a:lnSpc>
-                <a:spcPct val="90000"/>
-              </a:lnSpc>
-              <a:spcBef>
-                <a:spcPts val="0"/>
-              </a:spcBef>
-              <a:spcAft>
-                <a:spcPts val="0"/>
-              </a:spcAft>
-              <a:buNone/>
-            </a:pPr>
-            <a:r>
-              <a:rPr lang="en-US" sz="2400" dirty="0">
-                <a:latin typeface="Calibri"/>
-                <a:ea typeface="Calibri"/>
-                <a:cs typeface="Calibri"/>
-                <a:sym typeface="Calibri"/>
-                <a:hlinkClick r:id="rId5"/>
-              </a:rPr>
-              <a:t>https://databricks.com</a:t>
-            </a:r>
-            <a:r>
-              <a:rPr lang="en-US" sz="2400" dirty="0" smtClean="0">
-                <a:latin typeface="Calibri"/>
-                <a:ea typeface="Calibri"/>
-                <a:cs typeface="Calibri"/>
-                <a:sym typeface="Calibri"/>
-                <a:hlinkClick r:id="rId5"/>
-              </a:rPr>
-              <a:t>/</a:t>
-            </a:r>
-            <a:endParaRPr lang="en-US" sz="2400" dirty="0" smtClean="0">
+            <a:endParaRPr lang="en-US" sz="2800" b="1" dirty="0">
               <a:latin typeface="Calibri"/>
               <a:ea typeface="Calibri"/>
               <a:cs typeface="Calibri"/>
               <a:sym typeface="Calibri"/>
             </a:endParaRPr>
           </a:p>
-          <a:p>
-            <a:pPr marR="0" lvl="0" algn="l" rtl="0">
-              <a:lnSpc>
-                <a:spcPct val="90000"/>
-              </a:lnSpc>
-              <a:spcBef>
-                <a:spcPts val="0"/>
-              </a:spcBef>
-              <a:spcAft>
-                <a:spcPts val="0"/>
-              </a:spcAft>
-              <a:buNone/>
-            </a:pPr>
-            <a:endParaRPr lang="en-US" sz="2400" dirty="0">
-              <a:latin typeface="Calibri"/>
-              <a:ea typeface="Calibri"/>
-              <a:cs typeface="Calibri"/>
-              <a:sym typeface="Calibri"/>
-            </a:endParaRPr>
-          </a:p>
         </p:txBody>
       </p:sp>
       <p:sp>
         <p:nvSpPr>
-          <p:cNvPr id="174" name="Shape 174"/>
+          <p:cNvPr id="168" name="Shape 168"/>
           <p:cNvSpPr txBox="1"/>
           <p:nvPr/>
         </p:nvSpPr>
@@ -10457,7 +10917,7 @@
               <a:buNone/>
             </a:pPr>
             <a:r>
-              <a:rPr lang="en-US" sz="4400">
+              <a:rPr lang="en-US" sz="4400" dirty="0" smtClean="0">
                 <a:solidFill>
                   <a:srgbClr val="1A496C"/>
                 </a:solidFill>
@@ -10466,12 +10926,388 @@
                 <a:cs typeface="Questrial"/>
                 <a:sym typeface="Questrial"/>
               </a:rPr>
-              <a:t>Links   </a:t>
+              <a:t>Word2Vec</a:t>
             </a:r>
+            <a:endParaRPr lang="en-US" sz="4400" dirty="0">
+              <a:solidFill>
+                <a:srgbClr val="1A496C"/>
+              </a:solidFill>
+              <a:latin typeface="Questrial"/>
+              <a:ea typeface="Questrial"/>
+              <a:cs typeface="Questrial"/>
+              <a:sym typeface="Questrial"/>
+            </a:endParaRPr>
           </a:p>
         </p:txBody>
       </p:sp>
     </p:spTree>
+    <p:extLst>
+      <p:ext uri="{BB962C8B-B14F-4D97-AF65-F5344CB8AC3E}">
+        <p14:creationId xmlns:p14="http://schemas.microsoft.com/office/powerpoint/2010/main" val="983511982"/>
+      </p:ext>
+    </p:extLst>
+  </p:cSld>
+  <p:clrMapOvr>
+    <a:masterClrMapping/>
+  </p:clrMapOvr>
+  <p:transition spd="slow">
+    <p:cut/>
+  </p:transition>
+  <p:timing>
+    <p:tnLst>
+      <p:par>
+        <p:cTn id="1" dur="indefinite" restart="never" nodeType="tmRoot"/>
+      </p:par>
+    </p:tnLst>
+  </p:timing>
+</p:sld>
+</file>
+
+<file path=ppt/slides/slide19.xml><?xml version="1.0" encoding="utf-8"?>
+<p:sld xmlns:a="http://schemas.openxmlformats.org/drawingml/2006/main" xmlns:r="http://schemas.openxmlformats.org/officeDocument/2006/relationships" xmlns:p="http://schemas.openxmlformats.org/presentationml/2006/main">
+  <p:cSld>
+    <p:bg>
+      <p:bgPr>
+        <a:solidFill>
+          <a:schemeClr val="lt1"/>
+        </a:solidFill>
+        <a:effectLst/>
+      </p:bgPr>
+    </p:bg>
+    <p:spTree>
+      <p:nvGrpSpPr>
+        <p:cNvPr id="1" name="Shape 166"/>
+        <p:cNvGrpSpPr/>
+        <p:nvPr/>
+      </p:nvGrpSpPr>
+      <p:grpSpPr>
+        <a:xfrm>
+          <a:off x="0" y="0"/>
+          <a:ext cx="0" cy="0"/>
+          <a:chOff x="0" y="0"/>
+          <a:chExt cx="0" cy="0"/>
+        </a:xfrm>
+      </p:grpSpPr>
+      <p:sp>
+        <p:nvSpPr>
+          <p:cNvPr id="167" name="Shape 167"/>
+          <p:cNvSpPr txBox="1"/>
+          <p:nvPr/>
+        </p:nvSpPr>
+        <p:spPr>
+          <a:xfrm>
+            <a:off x="562800" y="1376525"/>
+            <a:ext cx="8581200" cy="5273400"/>
+          </a:xfrm>
+          <a:prstGeom prst="rect">
+            <a:avLst/>
+          </a:prstGeom>
+          <a:noFill/>
+          <a:ln>
+            <a:noFill/>
+          </a:ln>
+        </p:spPr>
+        <p:txBody>
+          <a:bodyPr lIns="91425" tIns="45700" rIns="91425" bIns="45700" anchor="t" anchorCtr="0">
+            <a:noAutofit/>
+          </a:bodyPr>
+          <a:lstStyle/>
+          <a:p>
+            <a:pPr marR="0" lvl="0" algn="l" rtl="0">
+              <a:lnSpc>
+                <a:spcPct val="90000"/>
+              </a:lnSpc>
+              <a:spcBef>
+                <a:spcPts val="0"/>
+              </a:spcBef>
+              <a:spcAft>
+                <a:spcPts val="0"/>
+              </a:spcAft>
+              <a:buNone/>
+            </a:pPr>
+            <a:r>
+              <a:rPr lang="en-US" sz="3600" b="1" dirty="0" smtClean="0">
+                <a:solidFill>
+                  <a:srgbClr val="FB6A18"/>
+                </a:solidFill>
+                <a:latin typeface="Calibri"/>
+                <a:ea typeface="Calibri"/>
+                <a:cs typeface="Calibri"/>
+                <a:sym typeface="Calibri"/>
+              </a:rPr>
+              <a:t>A very simple explanation:</a:t>
+            </a:r>
+            <a:endParaRPr sz="3600" b="1" dirty="0" smtClean="0">
+              <a:solidFill>
+                <a:srgbClr val="FB6A18"/>
+              </a:solidFill>
+              <a:latin typeface="Calibri"/>
+              <a:ea typeface="Calibri"/>
+              <a:cs typeface="Calibri"/>
+              <a:sym typeface="Calibri"/>
+            </a:endParaRPr>
+          </a:p>
+          <a:p>
+            <a:pPr marL="742950" marR="0" lvl="0" indent="-742950" algn="l" rtl="0">
+              <a:lnSpc>
+                <a:spcPct val="90000"/>
+              </a:lnSpc>
+              <a:spcBef>
+                <a:spcPts val="0"/>
+              </a:spcBef>
+              <a:spcAft>
+                <a:spcPts val="0"/>
+              </a:spcAft>
+              <a:buFont typeface="+mj-lt"/>
+              <a:buAutoNum type="arabicPeriod"/>
+            </a:pPr>
+            <a:r>
+              <a:rPr lang="en-US" sz="2800" b="1" dirty="0" smtClean="0">
+                <a:latin typeface="Calibri"/>
+                <a:ea typeface="Calibri"/>
+                <a:cs typeface="Calibri"/>
+                <a:sym typeface="Calibri"/>
+              </a:rPr>
+              <a:t>For a corpus, find all unique words</a:t>
+            </a:r>
+          </a:p>
+          <a:p>
+            <a:pPr marL="742950" marR="0" lvl="0" indent="-742950" algn="l" rtl="0">
+              <a:lnSpc>
+                <a:spcPct val="90000"/>
+              </a:lnSpc>
+              <a:spcBef>
+                <a:spcPts val="0"/>
+              </a:spcBef>
+              <a:spcAft>
+                <a:spcPts val="0"/>
+              </a:spcAft>
+              <a:buFont typeface="+mj-lt"/>
+              <a:buAutoNum type="arabicPeriod"/>
+            </a:pPr>
+            <a:r>
+              <a:rPr lang="en-US" sz="2800" b="1" dirty="0" smtClean="0">
+                <a:latin typeface="Calibri"/>
+                <a:ea typeface="Calibri"/>
+                <a:cs typeface="Calibri"/>
+                <a:sym typeface="Calibri"/>
+              </a:rPr>
+              <a:t>Make a vector for each word with a single 1</a:t>
+            </a:r>
+          </a:p>
+          <a:p>
+            <a:pPr marL="742950" marR="0" lvl="0" indent="-742950" algn="l" rtl="0">
+              <a:lnSpc>
+                <a:spcPct val="90000"/>
+              </a:lnSpc>
+              <a:spcBef>
+                <a:spcPts val="0"/>
+              </a:spcBef>
+              <a:spcAft>
+                <a:spcPts val="0"/>
+              </a:spcAft>
+              <a:buFont typeface="+mj-lt"/>
+              <a:buAutoNum type="arabicPeriod"/>
+            </a:pPr>
+            <a:r>
+              <a:rPr lang="en-US" sz="2800" b="1" dirty="0" smtClean="0">
+                <a:latin typeface="Calibri"/>
+                <a:ea typeface="Calibri"/>
+                <a:cs typeface="Calibri"/>
+                <a:sym typeface="Calibri"/>
+              </a:rPr>
+              <a:t>Scan each document using a sliding window</a:t>
+            </a:r>
+          </a:p>
+          <a:p>
+            <a:pPr marL="742950" marR="0" lvl="0" indent="-742950" algn="l" rtl="0">
+              <a:lnSpc>
+                <a:spcPct val="90000"/>
+              </a:lnSpc>
+              <a:spcBef>
+                <a:spcPts val="0"/>
+              </a:spcBef>
+              <a:spcAft>
+                <a:spcPts val="0"/>
+              </a:spcAft>
+              <a:buFont typeface="+mj-lt"/>
+              <a:buAutoNum type="arabicPeriod"/>
+            </a:pPr>
+            <a:r>
+              <a:rPr lang="en-US" sz="2800" b="1" dirty="0" smtClean="0">
+                <a:latin typeface="Calibri"/>
+                <a:ea typeface="Calibri"/>
+                <a:cs typeface="Calibri"/>
+                <a:sym typeface="Calibri"/>
+              </a:rPr>
+              <a:t>To the vector of the word in the center of the window, add a little bit to each position that occurs in the window and subtract a little bit from a random sampling of those that don’t</a:t>
+            </a:r>
+            <a:r>
+              <a:rPr lang="en-US" sz="3600" b="1" dirty="0" smtClean="0">
+                <a:latin typeface="Calibri"/>
+                <a:ea typeface="Calibri"/>
+                <a:cs typeface="Calibri"/>
+                <a:sym typeface="Calibri"/>
+              </a:rPr>
+              <a:t>.</a:t>
+            </a:r>
+            <a:endParaRPr lang="en-US" sz="3600" b="1" dirty="0" smtClean="0">
+              <a:latin typeface="Calibri"/>
+              <a:ea typeface="Calibri"/>
+              <a:cs typeface="Calibri"/>
+              <a:sym typeface="Calibri"/>
+            </a:endParaRPr>
+          </a:p>
+          <a:p>
+            <a:pPr marR="0" lvl="0" algn="l" rtl="0">
+              <a:lnSpc>
+                <a:spcPct val="90000"/>
+              </a:lnSpc>
+              <a:spcBef>
+                <a:spcPts val="0"/>
+              </a:spcBef>
+              <a:spcAft>
+                <a:spcPts val="0"/>
+              </a:spcAft>
+              <a:buNone/>
+            </a:pPr>
+            <a:endParaRPr lang="en-US" sz="3600" b="1" dirty="0">
+              <a:latin typeface="Calibri"/>
+              <a:ea typeface="Calibri"/>
+              <a:cs typeface="Calibri"/>
+              <a:sym typeface="Calibri"/>
+            </a:endParaRPr>
+          </a:p>
+          <a:p>
+            <a:pPr marR="0" lvl="0" algn="l" rtl="0">
+              <a:lnSpc>
+                <a:spcPct val="90000"/>
+              </a:lnSpc>
+              <a:spcBef>
+                <a:spcPts val="0"/>
+              </a:spcBef>
+              <a:spcAft>
+                <a:spcPts val="0"/>
+              </a:spcAft>
+              <a:buNone/>
+            </a:pPr>
+            <a:r>
+              <a:rPr lang="en-US" sz="2800" dirty="0" smtClean="0">
+                <a:latin typeface="Calibri"/>
+                <a:ea typeface="Calibri"/>
+                <a:cs typeface="Calibri"/>
+                <a:sym typeface="Calibri"/>
+              </a:rPr>
+              <a:t>A </a:t>
+            </a:r>
+            <a:r>
+              <a:rPr lang="en-US" sz="2800" b="1" dirty="0" smtClean="0">
+                <a:latin typeface="Calibri"/>
+                <a:ea typeface="Calibri"/>
+                <a:cs typeface="Calibri"/>
+                <a:sym typeface="Calibri"/>
+              </a:rPr>
+              <a:t>MUCH</a:t>
+            </a:r>
+            <a:r>
+              <a:rPr lang="en-US" sz="2800" dirty="0" smtClean="0">
+                <a:latin typeface="Calibri"/>
+                <a:ea typeface="Calibri"/>
+                <a:cs typeface="Calibri"/>
+                <a:sym typeface="Calibri"/>
+              </a:rPr>
+              <a:t> better and approachable explanation:</a:t>
+            </a:r>
+          </a:p>
+          <a:p>
+            <a:pPr lvl="0">
+              <a:lnSpc>
+                <a:spcPct val="90000"/>
+              </a:lnSpc>
+            </a:pPr>
+            <a:r>
+              <a:rPr lang="en-US" sz="2800" b="1" dirty="0">
+                <a:latin typeface="Calibri"/>
+                <a:ea typeface="Calibri"/>
+                <a:cs typeface="Calibri"/>
+                <a:sym typeface="Calibri"/>
+              </a:rPr>
+              <a:t>http://mccormickml.com/2016/04/19/word2vec-tutorial-the-skip-gram-model/</a:t>
+            </a:r>
+            <a:endParaRPr lang="en-US" sz="2800" b="1" dirty="0">
+              <a:latin typeface="Calibri"/>
+              <a:ea typeface="Calibri"/>
+              <a:cs typeface="Calibri"/>
+              <a:sym typeface="Calibri"/>
+            </a:endParaRPr>
+          </a:p>
+        </p:txBody>
+      </p:sp>
+      <p:sp>
+        <p:nvSpPr>
+          <p:cNvPr id="168" name="Shape 168"/>
+          <p:cNvSpPr txBox="1"/>
+          <p:nvPr/>
+        </p:nvSpPr>
+        <p:spPr>
+          <a:xfrm>
+            <a:off x="533400" y="457200"/>
+            <a:ext cx="8216400" cy="769500"/>
+          </a:xfrm>
+          <a:prstGeom prst="rect">
+            <a:avLst/>
+          </a:prstGeom>
+          <a:noFill/>
+          <a:ln>
+            <a:noFill/>
+          </a:ln>
+        </p:spPr>
+        <p:txBody>
+          <a:bodyPr lIns="91425" tIns="45700" rIns="91425" bIns="45700" anchor="t" anchorCtr="0">
+            <a:noAutofit/>
+          </a:bodyPr>
+          <a:lstStyle/>
+          <a:p>
+            <a:pPr marL="0" marR="0" lvl="0" indent="0" algn="l" rtl="0">
+              <a:spcBef>
+                <a:spcPts val="0"/>
+              </a:spcBef>
+              <a:spcAft>
+                <a:spcPts val="0"/>
+              </a:spcAft>
+              <a:buSzPct val="25000"/>
+              <a:buNone/>
+            </a:pPr>
+            <a:r>
+              <a:rPr lang="en-US" sz="4400" dirty="0" smtClean="0">
+                <a:solidFill>
+                  <a:srgbClr val="1A496C"/>
+                </a:solidFill>
+                <a:latin typeface="Questrial"/>
+                <a:ea typeface="Questrial"/>
+                <a:cs typeface="Questrial"/>
+                <a:sym typeface="Questrial"/>
+              </a:rPr>
+              <a:t>Word2Vec - Making Vectors</a:t>
+            </a:r>
+            <a:endParaRPr lang="en-US" sz="4400" dirty="0">
+              <a:solidFill>
+                <a:srgbClr val="1A496C"/>
+              </a:solidFill>
+              <a:latin typeface="Questrial"/>
+              <a:ea typeface="Questrial"/>
+              <a:cs typeface="Questrial"/>
+              <a:sym typeface="Questrial"/>
+            </a:endParaRPr>
+          </a:p>
+        </p:txBody>
+      </p:sp>
+    </p:spTree>
+    <p:extLst>
+      <p:ext uri="{BB962C8B-B14F-4D97-AF65-F5344CB8AC3E}">
+        <p14:creationId xmlns:p14="http://schemas.microsoft.com/office/powerpoint/2010/main" val="1817445804"/>
+      </p:ext>
+    </p:extLst>
   </p:cSld>
   <p:clrMapOvr>
     <a:masterClrMapping/>
@@ -10744,6 +11580,986 @@
 </p:sld>
 </file>
 
+<file path=ppt/slides/slide20.xml><?xml version="1.0" encoding="utf-8"?>
+<p:sld xmlns:a="http://schemas.openxmlformats.org/drawingml/2006/main" xmlns:r="http://schemas.openxmlformats.org/officeDocument/2006/relationships" xmlns:p="http://schemas.openxmlformats.org/presentationml/2006/main">
+  <p:cSld>
+    <p:bg>
+      <p:bgPr>
+        <a:solidFill>
+          <a:schemeClr val="lt1"/>
+        </a:solidFill>
+        <a:effectLst/>
+      </p:bgPr>
+    </p:bg>
+    <p:spTree>
+      <p:nvGrpSpPr>
+        <p:cNvPr id="1" name="Shape 166"/>
+        <p:cNvGrpSpPr/>
+        <p:nvPr/>
+      </p:nvGrpSpPr>
+      <p:grpSpPr>
+        <a:xfrm>
+          <a:off x="0" y="0"/>
+          <a:ext cx="0" cy="0"/>
+          <a:chOff x="0" y="0"/>
+          <a:chExt cx="0" cy="0"/>
+        </a:xfrm>
+      </p:grpSpPr>
+      <p:sp>
+        <p:nvSpPr>
+          <p:cNvPr id="167" name="Shape 167"/>
+          <p:cNvSpPr txBox="1"/>
+          <p:nvPr/>
+        </p:nvSpPr>
+        <p:spPr>
+          <a:xfrm>
+            <a:off x="562800" y="1376525"/>
+            <a:ext cx="8581200" cy="5273400"/>
+          </a:xfrm>
+          <a:prstGeom prst="rect">
+            <a:avLst/>
+          </a:prstGeom>
+          <a:noFill/>
+          <a:ln>
+            <a:noFill/>
+          </a:ln>
+        </p:spPr>
+        <p:txBody>
+          <a:bodyPr lIns="91425" tIns="45700" rIns="91425" bIns="45700" anchor="t" anchorCtr="0">
+            <a:noAutofit/>
+          </a:bodyPr>
+          <a:lstStyle/>
+          <a:p>
+            <a:pPr marR="0" lvl="0" algn="l" rtl="0">
+              <a:lnSpc>
+                <a:spcPct val="90000"/>
+              </a:lnSpc>
+              <a:spcBef>
+                <a:spcPts val="0"/>
+              </a:spcBef>
+              <a:spcAft>
+                <a:spcPts val="0"/>
+              </a:spcAft>
+              <a:buNone/>
+            </a:pPr>
+            <a:r>
+              <a:rPr lang="en-US" sz="2800" b="1" dirty="0" smtClean="0">
+                <a:latin typeface="Calibri"/>
+                <a:ea typeface="Calibri"/>
+                <a:cs typeface="Calibri"/>
+                <a:sym typeface="Calibri"/>
+              </a:rPr>
+              <a:t>Synonyms</a:t>
+            </a:r>
+          </a:p>
+          <a:p>
+            <a:pPr marR="0" lvl="0" algn="l" rtl="0">
+              <a:lnSpc>
+                <a:spcPct val="90000"/>
+              </a:lnSpc>
+              <a:spcBef>
+                <a:spcPts val="0"/>
+              </a:spcBef>
+              <a:spcAft>
+                <a:spcPts val="0"/>
+              </a:spcAft>
+              <a:buNone/>
+            </a:pPr>
+            <a:endParaRPr lang="en-US" sz="2800" b="1" dirty="0" smtClean="0">
+              <a:latin typeface="Calibri"/>
+              <a:ea typeface="Calibri"/>
+              <a:cs typeface="Calibri"/>
+              <a:sym typeface="Calibri"/>
+            </a:endParaRPr>
+          </a:p>
+          <a:p>
+            <a:pPr marR="0" lvl="0" algn="l" rtl="0">
+              <a:lnSpc>
+                <a:spcPct val="90000"/>
+              </a:lnSpc>
+              <a:spcBef>
+                <a:spcPts val="0"/>
+              </a:spcBef>
+              <a:spcAft>
+                <a:spcPts val="0"/>
+              </a:spcAft>
+              <a:buNone/>
+            </a:pPr>
+            <a:r>
+              <a:rPr lang="en-US" sz="2800" b="1" dirty="0" smtClean="0">
+                <a:latin typeface="Calibri"/>
+                <a:ea typeface="Calibri"/>
+                <a:cs typeface="Calibri"/>
+                <a:sym typeface="Calibri"/>
+              </a:rPr>
+              <a:t>Clustering words into topics, common roots</a:t>
+            </a:r>
+            <a:endParaRPr lang="en-US" sz="2800" b="1" dirty="0" smtClean="0">
+              <a:latin typeface="Calibri"/>
+              <a:ea typeface="Calibri"/>
+              <a:cs typeface="Calibri"/>
+              <a:sym typeface="Calibri"/>
+            </a:endParaRPr>
+          </a:p>
+          <a:p>
+            <a:pPr marR="0" lvl="0" algn="l" rtl="0">
+              <a:lnSpc>
+                <a:spcPct val="90000"/>
+              </a:lnSpc>
+              <a:spcBef>
+                <a:spcPts val="0"/>
+              </a:spcBef>
+              <a:spcAft>
+                <a:spcPts val="0"/>
+              </a:spcAft>
+              <a:buNone/>
+            </a:pPr>
+            <a:endParaRPr lang="en-US" sz="2800" b="1" dirty="0">
+              <a:latin typeface="Calibri"/>
+              <a:ea typeface="Calibri"/>
+              <a:cs typeface="Calibri"/>
+              <a:sym typeface="Calibri"/>
+            </a:endParaRPr>
+          </a:p>
+          <a:p>
+            <a:pPr marR="0" lvl="0" algn="l" rtl="0">
+              <a:lnSpc>
+                <a:spcPct val="90000"/>
+              </a:lnSpc>
+              <a:spcBef>
+                <a:spcPts val="0"/>
+              </a:spcBef>
+              <a:spcAft>
+                <a:spcPts val="0"/>
+              </a:spcAft>
+              <a:buNone/>
+            </a:pPr>
+            <a:r>
+              <a:rPr lang="en-US" sz="2800" b="1" dirty="0" smtClean="0">
+                <a:latin typeface="Calibri"/>
+                <a:ea typeface="Calibri"/>
+                <a:cs typeface="Calibri"/>
+                <a:sym typeface="Calibri"/>
+              </a:rPr>
+              <a:t>Analogies (the infamous king – man + woman = king)</a:t>
+            </a:r>
+          </a:p>
+          <a:p>
+            <a:pPr marR="0" lvl="0" algn="l" rtl="0">
+              <a:lnSpc>
+                <a:spcPct val="90000"/>
+              </a:lnSpc>
+              <a:spcBef>
+                <a:spcPts val="0"/>
+              </a:spcBef>
+              <a:spcAft>
+                <a:spcPts val="0"/>
+              </a:spcAft>
+              <a:buNone/>
+            </a:pPr>
+            <a:endParaRPr lang="en-US" sz="2800" b="1" dirty="0">
+              <a:latin typeface="Calibri"/>
+              <a:ea typeface="Calibri"/>
+              <a:cs typeface="Calibri"/>
+              <a:sym typeface="Calibri"/>
+            </a:endParaRPr>
+          </a:p>
+          <a:p>
+            <a:pPr marR="0" lvl="0" algn="l" rtl="0">
+              <a:lnSpc>
+                <a:spcPct val="90000"/>
+              </a:lnSpc>
+              <a:spcBef>
+                <a:spcPts val="0"/>
+              </a:spcBef>
+              <a:spcAft>
+                <a:spcPts val="0"/>
+              </a:spcAft>
+              <a:buNone/>
+            </a:pPr>
+            <a:endParaRPr lang="en-US" sz="2800" b="1" dirty="0" smtClean="0">
+              <a:latin typeface="Calibri"/>
+              <a:ea typeface="Calibri"/>
+              <a:cs typeface="Calibri"/>
+              <a:sym typeface="Calibri"/>
+            </a:endParaRPr>
+          </a:p>
+          <a:p>
+            <a:pPr marR="0" lvl="0" algn="l" rtl="0">
+              <a:lnSpc>
+                <a:spcPct val="90000"/>
+              </a:lnSpc>
+              <a:spcBef>
+                <a:spcPts val="0"/>
+              </a:spcBef>
+              <a:spcAft>
+                <a:spcPts val="0"/>
+              </a:spcAft>
+              <a:buNone/>
+            </a:pPr>
+            <a:endParaRPr lang="en-US" sz="2800" b="1" dirty="0">
+              <a:latin typeface="Calibri"/>
+              <a:ea typeface="Calibri"/>
+              <a:cs typeface="Calibri"/>
+              <a:sym typeface="Calibri"/>
+            </a:endParaRPr>
+          </a:p>
+          <a:p>
+            <a:pPr lvl="0">
+              <a:lnSpc>
+                <a:spcPct val="90000"/>
+              </a:lnSpc>
+            </a:pPr>
+            <a:r>
+              <a:rPr lang="en-US" sz="2800" b="1" dirty="0">
+                <a:latin typeface="Calibri"/>
+                <a:ea typeface="Calibri"/>
+                <a:cs typeface="Calibri"/>
+                <a:sym typeface="Calibri"/>
+              </a:rPr>
+              <a:t>https://www.distilled.net/resources/a-beginners-guide-to-word2vec-aka-whats-the-opposite-of-canada</a:t>
+            </a:r>
+            <a:r>
+              <a:rPr lang="en-US" sz="2800" b="1" dirty="0" smtClean="0">
+                <a:latin typeface="Calibri"/>
+                <a:ea typeface="Calibri"/>
+                <a:cs typeface="Calibri"/>
+                <a:sym typeface="Calibri"/>
+              </a:rPr>
+              <a:t>/</a:t>
+            </a:r>
+          </a:p>
+          <a:p>
+            <a:pPr lvl="0">
+              <a:lnSpc>
+                <a:spcPct val="90000"/>
+              </a:lnSpc>
+            </a:pPr>
+            <a:endParaRPr lang="en-US" sz="2800" b="1" dirty="0">
+              <a:latin typeface="Calibri"/>
+              <a:ea typeface="Calibri"/>
+              <a:cs typeface="Calibri"/>
+              <a:sym typeface="Calibri"/>
+            </a:endParaRPr>
+          </a:p>
+          <a:p>
+            <a:pPr lvl="0">
+              <a:lnSpc>
+                <a:spcPct val="90000"/>
+              </a:lnSpc>
+            </a:pPr>
+            <a:r>
+              <a:rPr lang="en-US" sz="2800" b="1" dirty="0" smtClean="0">
+                <a:latin typeface="Calibri"/>
+                <a:ea typeface="Calibri"/>
+                <a:cs typeface="Calibri"/>
+                <a:sym typeface="Calibri"/>
+              </a:rPr>
+              <a:t>https</a:t>
+            </a:r>
+            <a:r>
+              <a:rPr lang="en-US" sz="2800" b="1" dirty="0">
+                <a:latin typeface="Calibri"/>
+                <a:ea typeface="Calibri"/>
+                <a:cs typeface="Calibri"/>
+                <a:sym typeface="Calibri"/>
+              </a:rPr>
+              <a:t>://www.quora.com/What-are-some-interesting-Word2Vec-results</a:t>
+            </a:r>
+            <a:endParaRPr lang="en-US" sz="2800" b="1" dirty="0">
+              <a:latin typeface="Calibri"/>
+              <a:ea typeface="Calibri"/>
+              <a:cs typeface="Calibri"/>
+              <a:sym typeface="Calibri"/>
+            </a:endParaRPr>
+          </a:p>
+        </p:txBody>
+      </p:sp>
+      <p:sp>
+        <p:nvSpPr>
+          <p:cNvPr id="168" name="Shape 168"/>
+          <p:cNvSpPr txBox="1"/>
+          <p:nvPr/>
+        </p:nvSpPr>
+        <p:spPr>
+          <a:xfrm>
+            <a:off x="533400" y="457200"/>
+            <a:ext cx="8216400" cy="769500"/>
+          </a:xfrm>
+          <a:prstGeom prst="rect">
+            <a:avLst/>
+          </a:prstGeom>
+          <a:noFill/>
+          <a:ln>
+            <a:noFill/>
+          </a:ln>
+        </p:spPr>
+        <p:txBody>
+          <a:bodyPr lIns="91425" tIns="45700" rIns="91425" bIns="45700" anchor="t" anchorCtr="0">
+            <a:noAutofit/>
+          </a:bodyPr>
+          <a:lstStyle/>
+          <a:p>
+            <a:pPr marL="0" marR="0" lvl="0" indent="0" algn="l" rtl="0">
+              <a:spcBef>
+                <a:spcPts val="0"/>
+              </a:spcBef>
+              <a:spcAft>
+                <a:spcPts val="0"/>
+              </a:spcAft>
+              <a:buSzPct val="25000"/>
+              <a:buNone/>
+            </a:pPr>
+            <a:r>
+              <a:rPr lang="en-US" sz="4400" dirty="0" smtClean="0">
+                <a:solidFill>
+                  <a:srgbClr val="1A496C"/>
+                </a:solidFill>
+                <a:latin typeface="Questrial"/>
+                <a:ea typeface="Questrial"/>
+                <a:cs typeface="Questrial"/>
+                <a:sym typeface="Questrial"/>
+              </a:rPr>
+              <a:t>Word2Vec – Uses</a:t>
+            </a:r>
+            <a:endParaRPr lang="en-US" sz="4400" dirty="0">
+              <a:solidFill>
+                <a:srgbClr val="1A496C"/>
+              </a:solidFill>
+              <a:latin typeface="Questrial"/>
+              <a:ea typeface="Questrial"/>
+              <a:cs typeface="Questrial"/>
+              <a:sym typeface="Questrial"/>
+            </a:endParaRPr>
+          </a:p>
+        </p:txBody>
+      </p:sp>
+    </p:spTree>
+    <p:extLst>
+      <p:ext uri="{BB962C8B-B14F-4D97-AF65-F5344CB8AC3E}">
+        <p14:creationId xmlns:p14="http://schemas.microsoft.com/office/powerpoint/2010/main" val="2646572779"/>
+      </p:ext>
+    </p:extLst>
+  </p:cSld>
+  <p:clrMapOvr>
+    <a:masterClrMapping/>
+  </p:clrMapOvr>
+  <p:transition spd="slow">
+    <p:cut/>
+  </p:transition>
+  <p:timing>
+    <p:tnLst>
+      <p:par>
+        <p:cTn id="1" dur="indefinite" restart="never" nodeType="tmRoot"/>
+      </p:par>
+    </p:tnLst>
+  </p:timing>
+</p:sld>
+</file>
+
+<file path=ppt/slides/slide21.xml><?xml version="1.0" encoding="utf-8"?>
+<p:sld xmlns:a="http://schemas.openxmlformats.org/drawingml/2006/main" xmlns:r="http://schemas.openxmlformats.org/officeDocument/2006/relationships" xmlns:p="http://schemas.openxmlformats.org/presentationml/2006/main">
+  <p:cSld>
+    <p:bg>
+      <p:bgPr>
+        <a:solidFill>
+          <a:schemeClr val="lt1"/>
+        </a:solidFill>
+        <a:effectLst/>
+      </p:bgPr>
+    </p:bg>
+    <p:spTree>
+      <p:nvGrpSpPr>
+        <p:cNvPr id="1" name="Shape 166"/>
+        <p:cNvGrpSpPr/>
+        <p:nvPr/>
+      </p:nvGrpSpPr>
+      <p:grpSpPr>
+        <a:xfrm>
+          <a:off x="0" y="0"/>
+          <a:ext cx="0" cy="0"/>
+          <a:chOff x="0" y="0"/>
+          <a:chExt cx="0" cy="0"/>
+        </a:xfrm>
+      </p:grpSpPr>
+      <p:sp>
+        <p:nvSpPr>
+          <p:cNvPr id="167" name="Shape 167"/>
+          <p:cNvSpPr txBox="1"/>
+          <p:nvPr/>
+        </p:nvSpPr>
+        <p:spPr>
+          <a:xfrm>
+            <a:off x="562725" y="1376525"/>
+            <a:ext cx="8581200" cy="5273400"/>
+          </a:xfrm>
+          <a:prstGeom prst="rect">
+            <a:avLst/>
+          </a:prstGeom>
+          <a:noFill/>
+          <a:ln>
+            <a:noFill/>
+          </a:ln>
+        </p:spPr>
+        <p:txBody>
+          <a:bodyPr lIns="91425" tIns="45700" rIns="91425" bIns="45700" anchor="t" anchorCtr="0">
+            <a:noAutofit/>
+          </a:bodyPr>
+          <a:lstStyle/>
+          <a:p>
+            <a:pPr marR="0" lvl="0" algn="l" rtl="0">
+              <a:lnSpc>
+                <a:spcPct val="90000"/>
+              </a:lnSpc>
+              <a:spcBef>
+                <a:spcPts val="0"/>
+              </a:spcBef>
+              <a:spcAft>
+                <a:spcPts val="0"/>
+              </a:spcAft>
+              <a:buNone/>
+            </a:pPr>
+            <a:endParaRPr sz="3600" b="1" dirty="0">
+              <a:solidFill>
+                <a:srgbClr val="FB6A18"/>
+              </a:solidFill>
+              <a:latin typeface="Calibri"/>
+              <a:ea typeface="Calibri"/>
+              <a:cs typeface="Calibri"/>
+              <a:sym typeface="Calibri"/>
+            </a:endParaRPr>
+          </a:p>
+          <a:p>
+            <a:pPr marR="0" lvl="0" algn="l" rtl="0">
+              <a:lnSpc>
+                <a:spcPct val="90000"/>
+              </a:lnSpc>
+              <a:spcBef>
+                <a:spcPts val="0"/>
+              </a:spcBef>
+              <a:spcAft>
+                <a:spcPts val="0"/>
+              </a:spcAft>
+              <a:buNone/>
+            </a:pPr>
+            <a:endParaRPr sz="3600" b="1" dirty="0">
+              <a:solidFill>
+                <a:srgbClr val="FB6A18"/>
+              </a:solidFill>
+              <a:latin typeface="Calibri"/>
+              <a:ea typeface="Calibri"/>
+              <a:cs typeface="Calibri"/>
+              <a:sym typeface="Calibri"/>
+            </a:endParaRPr>
+          </a:p>
+          <a:p>
+            <a:pPr marR="0" lvl="0" algn="l" rtl="0">
+              <a:lnSpc>
+                <a:spcPct val="90000"/>
+              </a:lnSpc>
+              <a:spcBef>
+                <a:spcPts val="0"/>
+              </a:spcBef>
+              <a:spcAft>
+                <a:spcPts val="0"/>
+              </a:spcAft>
+              <a:buNone/>
+            </a:pPr>
+            <a:r>
+              <a:rPr lang="en-US" sz="3600" dirty="0" smtClean="0">
+                <a:latin typeface="Calibri"/>
+                <a:ea typeface="Calibri"/>
+                <a:cs typeface="Calibri"/>
+                <a:sym typeface="Calibri"/>
+              </a:rPr>
+              <a:t>Let’s try some synonyms</a:t>
+            </a:r>
+          </a:p>
+          <a:p>
+            <a:pPr marR="0" lvl="0" algn="l" rtl="0">
+              <a:lnSpc>
+                <a:spcPct val="90000"/>
+              </a:lnSpc>
+              <a:spcBef>
+                <a:spcPts val="0"/>
+              </a:spcBef>
+              <a:spcAft>
+                <a:spcPts val="0"/>
+              </a:spcAft>
+              <a:buNone/>
+            </a:pPr>
+            <a:endParaRPr sz="3600" b="1" dirty="0">
+              <a:latin typeface="Calibri"/>
+              <a:ea typeface="Calibri"/>
+              <a:cs typeface="Calibri"/>
+              <a:sym typeface="Calibri"/>
+            </a:endParaRPr>
+          </a:p>
+          <a:p>
+            <a:pPr marR="0" lvl="0" algn="l" rtl="0">
+              <a:lnSpc>
+                <a:spcPct val="90000"/>
+              </a:lnSpc>
+              <a:spcBef>
+                <a:spcPts val="0"/>
+              </a:spcBef>
+              <a:spcAft>
+                <a:spcPts val="0"/>
+              </a:spcAft>
+              <a:buNone/>
+            </a:pPr>
+            <a:r>
+              <a:rPr lang="en-US" sz="3600" b="1" dirty="0">
+                <a:latin typeface="Calibri"/>
+                <a:ea typeface="Calibri"/>
+                <a:cs typeface="Calibri"/>
+                <a:sym typeface="Calibri"/>
+              </a:rPr>
+              <a:t>             To the </a:t>
+            </a:r>
+            <a:r>
+              <a:rPr lang="en-US" sz="3600" b="1" dirty="0" err="1">
+                <a:latin typeface="Calibri"/>
+                <a:ea typeface="Calibri"/>
+                <a:cs typeface="Calibri"/>
+                <a:sym typeface="Calibri"/>
+              </a:rPr>
+              <a:t>Jupyter</a:t>
+            </a:r>
+            <a:r>
+              <a:rPr lang="en-US" sz="3600" b="1" dirty="0">
+                <a:latin typeface="Calibri"/>
+                <a:ea typeface="Calibri"/>
+                <a:cs typeface="Calibri"/>
+                <a:sym typeface="Calibri"/>
+              </a:rPr>
+              <a:t> notebook!</a:t>
+            </a:r>
+          </a:p>
+        </p:txBody>
+      </p:sp>
+      <p:sp>
+        <p:nvSpPr>
+          <p:cNvPr id="168" name="Shape 168"/>
+          <p:cNvSpPr txBox="1"/>
+          <p:nvPr/>
+        </p:nvSpPr>
+        <p:spPr>
+          <a:xfrm>
+            <a:off x="533400" y="457200"/>
+            <a:ext cx="8216400" cy="769500"/>
+          </a:xfrm>
+          <a:prstGeom prst="rect">
+            <a:avLst/>
+          </a:prstGeom>
+          <a:noFill/>
+          <a:ln>
+            <a:noFill/>
+          </a:ln>
+        </p:spPr>
+        <p:txBody>
+          <a:bodyPr lIns="91425" tIns="45700" rIns="91425" bIns="45700" anchor="t" anchorCtr="0">
+            <a:noAutofit/>
+          </a:bodyPr>
+          <a:lstStyle/>
+          <a:p>
+            <a:pPr marL="0" marR="0" lvl="0" indent="0" algn="l" rtl="0">
+              <a:spcBef>
+                <a:spcPts val="0"/>
+              </a:spcBef>
+              <a:spcAft>
+                <a:spcPts val="0"/>
+              </a:spcAft>
+              <a:buSzPct val="25000"/>
+              <a:buNone/>
+            </a:pPr>
+            <a:r>
+              <a:rPr lang="en-US" sz="4400" dirty="0">
+                <a:solidFill>
+                  <a:srgbClr val="1A496C"/>
+                </a:solidFill>
+                <a:latin typeface="Questrial"/>
+                <a:ea typeface="Questrial"/>
+                <a:cs typeface="Questrial"/>
+                <a:sym typeface="Questrial"/>
+              </a:rPr>
+              <a:t>Using </a:t>
+            </a:r>
+            <a:r>
+              <a:rPr lang="en-US" sz="4400" dirty="0" smtClean="0">
+                <a:solidFill>
+                  <a:srgbClr val="1A496C"/>
+                </a:solidFill>
+                <a:latin typeface="Questrial"/>
+                <a:ea typeface="Questrial"/>
+                <a:cs typeface="Questrial"/>
+                <a:sym typeface="Questrial"/>
+              </a:rPr>
+              <a:t>Word2Vec    </a:t>
+            </a:r>
+            <a:endParaRPr lang="en-US" sz="4400" dirty="0">
+              <a:solidFill>
+                <a:srgbClr val="1A496C"/>
+              </a:solidFill>
+              <a:latin typeface="Questrial"/>
+              <a:ea typeface="Questrial"/>
+              <a:cs typeface="Questrial"/>
+              <a:sym typeface="Questrial"/>
+            </a:endParaRPr>
+          </a:p>
+        </p:txBody>
+      </p:sp>
+    </p:spTree>
+    <p:extLst>
+      <p:ext uri="{BB962C8B-B14F-4D97-AF65-F5344CB8AC3E}">
+        <p14:creationId xmlns:p14="http://schemas.microsoft.com/office/powerpoint/2010/main" val="116517029"/>
+      </p:ext>
+    </p:extLst>
+  </p:cSld>
+  <p:clrMapOvr>
+    <a:masterClrMapping/>
+  </p:clrMapOvr>
+  <p:transition spd="slow">
+    <p:cut/>
+  </p:transition>
+  <p:timing>
+    <p:tnLst>
+      <p:par>
+        <p:cTn id="1" dur="indefinite" restart="never" nodeType="tmRoot"/>
+      </p:par>
+    </p:tnLst>
+  </p:timing>
+</p:sld>
+</file>
+
+<file path=ppt/slides/slide22.xml><?xml version="1.0" encoding="utf-8"?>
+<p:sld xmlns:a="http://schemas.openxmlformats.org/drawingml/2006/main" xmlns:r="http://schemas.openxmlformats.org/officeDocument/2006/relationships" xmlns:p="http://schemas.openxmlformats.org/presentationml/2006/main">
+  <p:cSld>
+    <p:bg>
+      <p:bgPr>
+        <a:solidFill>
+          <a:schemeClr val="lt1"/>
+        </a:solidFill>
+        <a:effectLst/>
+      </p:bgPr>
+    </p:bg>
+    <p:spTree>
+      <p:nvGrpSpPr>
+        <p:cNvPr id="1" name="Shape 172"/>
+        <p:cNvGrpSpPr/>
+        <p:nvPr/>
+      </p:nvGrpSpPr>
+      <p:grpSpPr>
+        <a:xfrm>
+          <a:off x="0" y="0"/>
+          <a:ext cx="0" cy="0"/>
+          <a:chOff x="0" y="0"/>
+          <a:chExt cx="0" cy="0"/>
+        </a:xfrm>
+      </p:grpSpPr>
+      <p:sp>
+        <p:nvSpPr>
+          <p:cNvPr id="173" name="Shape 173"/>
+          <p:cNvSpPr txBox="1"/>
+          <p:nvPr/>
+        </p:nvSpPr>
+        <p:spPr>
+          <a:xfrm>
+            <a:off x="562725" y="1376525"/>
+            <a:ext cx="8581200" cy="5273400"/>
+          </a:xfrm>
+          <a:prstGeom prst="rect">
+            <a:avLst/>
+          </a:prstGeom>
+          <a:noFill/>
+          <a:ln>
+            <a:noFill/>
+          </a:ln>
+        </p:spPr>
+        <p:txBody>
+          <a:bodyPr lIns="91425" tIns="45700" rIns="91425" bIns="45700" anchor="t" anchorCtr="0">
+            <a:noAutofit/>
+          </a:bodyPr>
+          <a:lstStyle/>
+          <a:p>
+            <a:pPr marR="0" lvl="0" algn="l" rtl="0">
+              <a:lnSpc>
+                <a:spcPct val="90000"/>
+              </a:lnSpc>
+              <a:spcBef>
+                <a:spcPts val="0"/>
+              </a:spcBef>
+              <a:spcAft>
+                <a:spcPts val="0"/>
+              </a:spcAft>
+              <a:buNone/>
+            </a:pPr>
+            <a:r>
+              <a:rPr lang="en-US" sz="2400" b="1" dirty="0">
+                <a:latin typeface="Calibri"/>
+                <a:ea typeface="Calibri"/>
+                <a:cs typeface="Calibri"/>
+                <a:sym typeface="Calibri"/>
+              </a:rPr>
+              <a:t>Iterative machine learning in Spark: </a:t>
+            </a:r>
+            <a:r>
+              <a:rPr lang="en-US" sz="2400" u="sng" dirty="0">
+                <a:solidFill>
+                  <a:schemeClr val="hlink"/>
+                </a:solidFill>
+                <a:latin typeface="Calibri"/>
+                <a:ea typeface="Calibri"/>
+                <a:cs typeface="Calibri"/>
+                <a:sym typeface="Calibri"/>
+                <a:hlinkClick r:id="rId3"/>
+              </a:rPr>
+              <a:t>https://www.mapr.com/blog/parallel-and-iterative-processing-machine-learning-recommendations-spark</a:t>
+            </a:r>
+          </a:p>
+          <a:p>
+            <a:pPr marR="0" lvl="0" algn="l" rtl="0">
+              <a:lnSpc>
+                <a:spcPct val="90000"/>
+              </a:lnSpc>
+              <a:spcBef>
+                <a:spcPts val="0"/>
+              </a:spcBef>
+              <a:spcAft>
+                <a:spcPts val="0"/>
+              </a:spcAft>
+              <a:buNone/>
+            </a:pPr>
+            <a:endParaRPr sz="2400" dirty="0">
+              <a:latin typeface="Calibri"/>
+              <a:ea typeface="Calibri"/>
+              <a:cs typeface="Calibri"/>
+              <a:sym typeface="Calibri"/>
+            </a:endParaRPr>
+          </a:p>
+          <a:p>
+            <a:pPr marR="0" lvl="0" algn="l" rtl="0">
+              <a:lnSpc>
+                <a:spcPct val="90000"/>
+              </a:lnSpc>
+              <a:spcBef>
+                <a:spcPts val="0"/>
+              </a:spcBef>
+              <a:spcAft>
+                <a:spcPts val="0"/>
+              </a:spcAft>
+              <a:buNone/>
+            </a:pPr>
+            <a:r>
+              <a:rPr lang="en-US" sz="2400" b="1" dirty="0">
+                <a:latin typeface="Calibri"/>
+                <a:ea typeface="Calibri"/>
+                <a:cs typeface="Calibri"/>
+                <a:sym typeface="Calibri"/>
+              </a:rPr>
+              <a:t>Spark Python API Documentation:</a:t>
+            </a:r>
+          </a:p>
+          <a:p>
+            <a:pPr marR="0" lvl="0" algn="l" rtl="0">
+              <a:lnSpc>
+                <a:spcPct val="90000"/>
+              </a:lnSpc>
+              <a:spcBef>
+                <a:spcPts val="0"/>
+              </a:spcBef>
+              <a:spcAft>
+                <a:spcPts val="0"/>
+              </a:spcAft>
+              <a:buNone/>
+            </a:pPr>
+            <a:r>
+              <a:rPr lang="en-US" sz="2400" u="sng" dirty="0">
+                <a:solidFill>
+                  <a:schemeClr val="hlink"/>
+                </a:solidFill>
+                <a:latin typeface="Calibri"/>
+                <a:ea typeface="Calibri"/>
+                <a:cs typeface="Calibri"/>
+                <a:sym typeface="Calibri"/>
+                <a:hlinkClick r:id="rId4"/>
+              </a:rPr>
+              <a:t>http://spark.apache.org/docs/latest/api/python/</a:t>
+            </a:r>
+          </a:p>
+          <a:p>
+            <a:pPr marR="0" lvl="0" algn="l" rtl="0">
+              <a:lnSpc>
+                <a:spcPct val="90000"/>
+              </a:lnSpc>
+              <a:spcBef>
+                <a:spcPts val="0"/>
+              </a:spcBef>
+              <a:spcAft>
+                <a:spcPts val="0"/>
+              </a:spcAft>
+              <a:buNone/>
+            </a:pPr>
+            <a:endParaRPr sz="2400" dirty="0">
+              <a:latin typeface="Calibri"/>
+              <a:ea typeface="Calibri"/>
+              <a:cs typeface="Calibri"/>
+              <a:sym typeface="Calibri"/>
+            </a:endParaRPr>
+          </a:p>
+          <a:p>
+            <a:pPr marR="0" lvl="0" algn="l" rtl="0">
+              <a:lnSpc>
+                <a:spcPct val="90000"/>
+              </a:lnSpc>
+              <a:spcBef>
+                <a:spcPts val="0"/>
+              </a:spcBef>
+              <a:spcAft>
+                <a:spcPts val="0"/>
+              </a:spcAft>
+              <a:buNone/>
+            </a:pPr>
+            <a:r>
+              <a:rPr lang="en-US" sz="2400" b="1" dirty="0">
+                <a:latin typeface="Calibri"/>
+                <a:ea typeface="Calibri"/>
+                <a:cs typeface="Calibri"/>
+                <a:sym typeface="Calibri"/>
+              </a:rPr>
+              <a:t>Company that employs Spark’s creator:</a:t>
+            </a:r>
+          </a:p>
+          <a:p>
+            <a:pPr marR="0" lvl="0" algn="l" rtl="0">
+              <a:lnSpc>
+                <a:spcPct val="90000"/>
+              </a:lnSpc>
+              <a:spcBef>
+                <a:spcPts val="0"/>
+              </a:spcBef>
+              <a:spcAft>
+                <a:spcPts val="0"/>
+              </a:spcAft>
+              <a:buNone/>
+            </a:pPr>
+            <a:r>
+              <a:rPr lang="en-US" sz="2400" dirty="0">
+                <a:latin typeface="Calibri"/>
+                <a:ea typeface="Calibri"/>
+                <a:cs typeface="Calibri"/>
+                <a:sym typeface="Calibri"/>
+                <a:hlinkClick r:id="rId5"/>
+              </a:rPr>
+              <a:t>https://databricks.com</a:t>
+            </a:r>
+            <a:r>
+              <a:rPr lang="en-US" sz="2400" dirty="0" smtClean="0">
+                <a:latin typeface="Calibri"/>
+                <a:ea typeface="Calibri"/>
+                <a:cs typeface="Calibri"/>
+                <a:sym typeface="Calibri"/>
+                <a:hlinkClick r:id="rId5"/>
+              </a:rPr>
+              <a:t>/</a:t>
+            </a:r>
+            <a:endParaRPr lang="en-US" sz="2400" dirty="0" smtClean="0">
+              <a:latin typeface="Calibri"/>
+              <a:ea typeface="Calibri"/>
+              <a:cs typeface="Calibri"/>
+              <a:sym typeface="Calibri"/>
+            </a:endParaRPr>
+          </a:p>
+          <a:p>
+            <a:pPr marR="0" lvl="0" algn="l" rtl="0">
+              <a:lnSpc>
+                <a:spcPct val="90000"/>
+              </a:lnSpc>
+              <a:spcBef>
+                <a:spcPts val="0"/>
+              </a:spcBef>
+              <a:spcAft>
+                <a:spcPts val="0"/>
+              </a:spcAft>
+              <a:buNone/>
+            </a:pPr>
+            <a:endParaRPr lang="en-US" sz="2400" dirty="0">
+              <a:latin typeface="Calibri"/>
+              <a:ea typeface="Calibri"/>
+              <a:cs typeface="Calibri"/>
+              <a:sym typeface="Calibri"/>
+            </a:endParaRPr>
+          </a:p>
+        </p:txBody>
+      </p:sp>
+      <p:sp>
+        <p:nvSpPr>
+          <p:cNvPr id="174" name="Shape 174"/>
+          <p:cNvSpPr txBox="1"/>
+          <p:nvPr/>
+        </p:nvSpPr>
+        <p:spPr>
+          <a:xfrm>
+            <a:off x="533400" y="457200"/>
+            <a:ext cx="8216400" cy="769500"/>
+          </a:xfrm>
+          <a:prstGeom prst="rect">
+            <a:avLst/>
+          </a:prstGeom>
+          <a:noFill/>
+          <a:ln>
+            <a:noFill/>
+          </a:ln>
+        </p:spPr>
+        <p:txBody>
+          <a:bodyPr lIns="91425" tIns="45700" rIns="91425" bIns="45700" anchor="t" anchorCtr="0">
+            <a:noAutofit/>
+          </a:bodyPr>
+          <a:lstStyle/>
+          <a:p>
+            <a:pPr marL="0" marR="0" lvl="0" indent="0" algn="l" rtl="0">
+              <a:spcBef>
+                <a:spcPts val="0"/>
+              </a:spcBef>
+              <a:spcAft>
+                <a:spcPts val="0"/>
+              </a:spcAft>
+              <a:buSzPct val="25000"/>
+              <a:buNone/>
+            </a:pPr>
+            <a:r>
+              <a:rPr lang="en-US" sz="4400">
+                <a:solidFill>
+                  <a:srgbClr val="1A496C"/>
+                </a:solidFill>
+                <a:latin typeface="Questrial"/>
+                <a:ea typeface="Questrial"/>
+                <a:cs typeface="Questrial"/>
+                <a:sym typeface="Questrial"/>
+              </a:rPr>
+              <a:t>Links   </a:t>
+            </a:r>
+          </a:p>
+        </p:txBody>
+      </p:sp>
+    </p:spTree>
+  </p:cSld>
+  <p:clrMapOvr>
+    <a:masterClrMapping/>
+  </p:clrMapOvr>
+  <p:transition spd="slow">
+    <p:cut/>
+  </p:transition>
+  <p:timing>
+    <p:tnLst>
+      <p:par>
+        <p:cTn id="1" dur="indefinite" restart="never" nodeType="tmRoot"/>
+      </p:par>
+    </p:tnLst>
+  </p:timing>
+</p:sld>
+</file>
+
 <file path=ppt/slides/slide3.xml><?xml version="1.0" encoding="utf-8"?>
 <p:sld xmlns:a="http://schemas.openxmlformats.org/drawingml/2006/main" xmlns:r="http://schemas.openxmlformats.org/officeDocument/2006/relationships" xmlns:p="http://schemas.openxmlformats.org/presentationml/2006/main">
   <p:cSld>
@@ -10997,40 +12813,12 @@
       </p:sp>
       <p:pic>
         <p:nvPicPr>
-          <p:cNvPr id="73" name="Shape 73"/>
+          <p:cNvPr id="74" name="Shape 74"/>
           <p:cNvPicPr preferRelativeResize="0"/>
           <p:nvPr/>
         </p:nvPicPr>
         <p:blipFill>
           <a:blip r:embed="rId3">
-            <a:alphaModFix/>
-          </a:blip>
-          <a:stretch>
-            <a:fillRect/>
-          </a:stretch>
-        </p:blipFill>
-        <p:spPr>
-          <a:xfrm>
-            <a:off x="5499100" y="1840200"/>
-            <a:ext cx="2749425" cy="2749425"/>
-          </a:xfrm>
-          <a:prstGeom prst="rect">
-            <a:avLst/>
-          </a:prstGeom>
-          <a:noFill/>
-          <a:ln>
-            <a:noFill/>
-          </a:ln>
-        </p:spPr>
-      </p:pic>
-      <p:pic>
-        <p:nvPicPr>
-          <p:cNvPr id="74" name="Shape 74"/>
-          <p:cNvPicPr preferRelativeResize="0"/>
-          <p:nvPr/>
-        </p:nvPicPr>
-        <p:blipFill>
-          <a:blip r:embed="rId4">
             <a:alphaModFix/>
           </a:blip>
           <a:stretch>
@@ -11049,6 +12837,36 @@
           <a:ln>
             <a:noFill/>
           </a:ln>
+        </p:spPr>
+      </p:pic>
+      <p:pic>
+        <p:nvPicPr>
+          <p:cNvPr id="2" name="Picture 1"/>
+          <p:cNvPicPr>
+            <a:picLocks noChangeAspect="1"/>
+          </p:cNvPicPr>
+          <p:nvPr/>
+        </p:nvPicPr>
+        <p:blipFill>
+          <a:blip r:embed="rId4">
+            <a:extLst>
+              <a:ext uri="{28A0092B-C50C-407E-A947-70E740481C1C}">
+                <a14:useLocalDpi xmlns:a14="http://schemas.microsoft.com/office/drawing/2010/main" val="0"/>
+              </a:ext>
+            </a:extLst>
+          </a:blip>
+          <a:stretch>
+            <a:fillRect/>
+          </a:stretch>
+        </p:blipFill>
+        <p:spPr>
+          <a:xfrm>
+            <a:off x="5596466" y="2013374"/>
+            <a:ext cx="2368973" cy="2368973"/>
+          </a:xfrm>
+          <a:prstGeom prst="rect">
+            <a:avLst/>
+          </a:prstGeom>
         </p:spPr>
       </p:pic>
     </p:spTree>
@@ -11137,7 +12955,7 @@
               <a:buChar char="•"/>
             </a:pPr>
             <a:r>
-              <a:rPr lang="en-US" sz="3000">
+              <a:rPr lang="en-US" sz="3000" dirty="0">
                 <a:solidFill>
                   <a:srgbClr val="042C4F"/>
                 </a:solidFill>
@@ -11149,7 +12967,7 @@
               <a:t>Why Apache Spark?</a:t>
             </a:r>
             <a:r>
-              <a:rPr lang="en-US" sz="3000" b="0" i="0" u="none" strike="noStrike" cap="none">
+              <a:rPr lang="en-US" sz="3000" b="0" i="0" u="none" strike="noStrike" cap="none" dirty="0">
                 <a:solidFill>
                   <a:srgbClr val="3F3F3F"/>
                 </a:solidFill>
@@ -11180,7 +12998,7 @@
               <a:buChar char="•"/>
             </a:pPr>
             <a:r>
-              <a:rPr lang="en-US" sz="3000">
+              <a:rPr lang="en-US" sz="3000" dirty="0">
                 <a:latin typeface="Calibri"/>
                 <a:ea typeface="Calibri"/>
                 <a:cs typeface="Calibri"/>
@@ -11208,7 +13026,7 @@
               <a:buChar char="•"/>
             </a:pPr>
             <a:r>
-              <a:rPr lang="en-US" sz="3000">
+              <a:rPr lang="en-US" sz="3000" dirty="0">
                 <a:solidFill>
                   <a:srgbClr val="3F3F3F"/>
                 </a:solidFill>
@@ -11217,7 +13035,31 @@
                 <a:cs typeface="Calibri"/>
                 <a:sym typeface="Calibri"/>
               </a:rPr>
-              <a:t>Basic Spark DataFrame syntax</a:t>
+              <a:t>Basic Spark </a:t>
+            </a:r>
+            <a:r>
+              <a:rPr lang="en-US" sz="3000" dirty="0" err="1">
+                <a:solidFill>
+                  <a:srgbClr val="3F3F3F"/>
+                </a:solidFill>
+                <a:latin typeface="Calibri"/>
+                <a:ea typeface="Calibri"/>
+                <a:cs typeface="Calibri"/>
+                <a:sym typeface="Calibri"/>
+              </a:rPr>
+              <a:t>DataFrame</a:t>
+            </a:r>
+            <a:r>
+              <a:rPr lang="en-US" sz="3000" dirty="0">
+                <a:solidFill>
+                  <a:srgbClr val="3F3F3F"/>
+                </a:solidFill>
+                <a:latin typeface="Calibri"/>
+                <a:ea typeface="Calibri"/>
+                <a:cs typeface="Calibri"/>
+                <a:sym typeface="Calibri"/>
+              </a:rPr>
+              <a:t> syntax</a:t>
             </a:r>
           </a:p>
           <a:p>
@@ -11239,7 +13081,7 @@
               <a:buChar char="•"/>
             </a:pPr>
             <a:r>
-              <a:rPr lang="en-US" sz="3000">
+              <a:rPr lang="en-US" sz="3000" dirty="0">
                 <a:solidFill>
                   <a:srgbClr val="3F3F3F"/>
                 </a:solidFill>
@@ -11270,7 +13112,7 @@
               <a:buChar char="•"/>
             </a:pPr>
             <a:r>
-              <a:rPr lang="en-US" sz="3000">
+              <a:rPr lang="en-US" sz="3000" dirty="0">
                 <a:solidFill>
                   <a:srgbClr val="3F3F3F"/>
                 </a:solidFill>
@@ -11301,7 +13143,7 @@
               <a:buChar char="•"/>
             </a:pPr>
             <a:r>
-              <a:rPr lang="en-US" sz="3000">
+              <a:rPr lang="en-US" sz="3000" dirty="0">
                 <a:solidFill>
                   <a:srgbClr val="3F3F3F"/>
                 </a:solidFill>
@@ -11326,7 +13168,7 @@
               </a:spcAft>
               <a:buNone/>
             </a:pPr>
-            <a:endParaRPr sz="2800">
+            <a:endParaRPr sz="2800" dirty="0">
               <a:solidFill>
                 <a:srgbClr val="3F3F3F"/>
               </a:solidFill>
@@ -11349,7 +13191,7 @@
               </a:spcAft>
               <a:buNone/>
             </a:pPr>
-            <a:endParaRPr sz="2800">
+            <a:endParaRPr sz="2800" dirty="0">
               <a:solidFill>
                 <a:srgbClr val="3F3F3F"/>
               </a:solidFill>
@@ -11376,7 +13218,7 @@
               <a:buFont typeface="Arial"/>
               <a:buNone/>
             </a:pPr>
-            <a:endParaRPr sz="1500" b="0" i="0" u="none" strike="noStrike" cap="none">
+            <a:endParaRPr sz="1500" b="0" i="0" u="none" strike="noStrike" cap="none" dirty="0">
               <a:solidFill>
                 <a:srgbClr val="042C4F"/>
               </a:solidFill>
@@ -11399,7 +13241,7 @@
               </a:spcAft>
               <a:buNone/>
             </a:pPr>
-            <a:endParaRPr/>
+            <a:endParaRPr dirty="0"/>
           </a:p>
         </p:txBody>
       </p:sp>
@@ -12946,7 +14788,19 @@
                 <a:cs typeface="Calibri"/>
                 <a:sym typeface="Calibri"/>
               </a:rPr>
-              <a:t>– ALS </a:t>
+              <a:t>– </a:t>
+            </a:r>
+            <a:r>
+              <a:rPr lang="en-US" sz="3600" dirty="0" smtClean="0">
+                <a:solidFill>
+                  <a:srgbClr val="042C4F"/>
+                </a:solidFill>
+                <a:latin typeface="Calibri"/>
+                <a:ea typeface="Calibri"/>
+                <a:cs typeface="Calibri"/>
+                <a:sym typeface="Calibri"/>
+              </a:rPr>
+              <a:t>ALS </a:t>
             </a:r>
             <a:r>
               <a:rPr lang="en-US" sz="3600" dirty="0" err="1" smtClean="0">

</xml_diff>